<commit_message>
Added self tests to TimelineDiagrams and Snapshot Intro.
</commit_message>
<xml_diff>
--- a/TimelineDiagrams/TimelineDiagrams.pptx
+++ b/TimelineDiagrams/TimelineDiagrams.pptx
@@ -206,7 +206,7 @@
           <a:p>
             <a:fld id="{140B3D56-00BB-5741-9273-561FF9F59001}" type="datetimeFigureOut">
               <a:rPr lang="en-US" smtClean="0"/>
-              <a:t>8/13/21</a:t>
+              <a:t>8/30/21</a:t>
             </a:fld>
             <a:endParaRPr lang="en-US"/>
           </a:p>
@@ -1159,7 +1159,7 @@
           <a:p>
             <a:fld id="{B541AD58-FDB1-E648-B24C-BDECB6C800BE}" type="datetimeFigureOut">
               <a:rPr lang="en-US" smtClean="0"/>
-              <a:t>8/13/21</a:t>
+              <a:t>8/30/21</a:t>
             </a:fld>
             <a:endParaRPr lang="en-US"/>
           </a:p>
@@ -1329,7 +1329,7 @@
           <a:p>
             <a:fld id="{B541AD58-FDB1-E648-B24C-BDECB6C800BE}" type="datetimeFigureOut">
               <a:rPr lang="en-US" smtClean="0"/>
-              <a:t>8/13/21</a:t>
+              <a:t>8/30/21</a:t>
             </a:fld>
             <a:endParaRPr lang="en-US"/>
           </a:p>
@@ -1509,7 +1509,7 @@
           <a:p>
             <a:fld id="{B541AD58-FDB1-E648-B24C-BDECB6C800BE}" type="datetimeFigureOut">
               <a:rPr lang="en-US" smtClean="0"/>
-              <a:t>8/13/21</a:t>
+              <a:t>8/30/21</a:t>
             </a:fld>
             <a:endParaRPr lang="en-US"/>
           </a:p>
@@ -1679,7 +1679,7 @@
           <a:p>
             <a:fld id="{B541AD58-FDB1-E648-B24C-BDECB6C800BE}" type="datetimeFigureOut">
               <a:rPr lang="en-US" smtClean="0"/>
-              <a:t>8/13/21</a:t>
+              <a:t>8/30/21</a:t>
             </a:fld>
             <a:endParaRPr lang="en-US"/>
           </a:p>
@@ -1925,7 +1925,7 @@
           <a:p>
             <a:fld id="{B541AD58-FDB1-E648-B24C-BDECB6C800BE}" type="datetimeFigureOut">
               <a:rPr lang="en-US" smtClean="0"/>
-              <a:t>8/13/21</a:t>
+              <a:t>8/30/21</a:t>
             </a:fld>
             <a:endParaRPr lang="en-US"/>
           </a:p>
@@ -2213,7 +2213,7 @@
           <a:p>
             <a:fld id="{B541AD58-FDB1-E648-B24C-BDECB6C800BE}" type="datetimeFigureOut">
               <a:rPr lang="en-US" smtClean="0"/>
-              <a:t>8/13/21</a:t>
+              <a:t>8/30/21</a:t>
             </a:fld>
             <a:endParaRPr lang="en-US"/>
           </a:p>
@@ -2635,7 +2635,7 @@
           <a:p>
             <a:fld id="{B541AD58-FDB1-E648-B24C-BDECB6C800BE}" type="datetimeFigureOut">
               <a:rPr lang="en-US" smtClean="0"/>
-              <a:t>8/13/21</a:t>
+              <a:t>8/30/21</a:t>
             </a:fld>
             <a:endParaRPr lang="en-US"/>
           </a:p>
@@ -2753,7 +2753,7 @@
           <a:p>
             <a:fld id="{B541AD58-FDB1-E648-B24C-BDECB6C800BE}" type="datetimeFigureOut">
               <a:rPr lang="en-US" smtClean="0"/>
-              <a:t>8/13/21</a:t>
+              <a:t>8/30/21</a:t>
             </a:fld>
             <a:endParaRPr lang="en-US"/>
           </a:p>
@@ -2848,7 +2848,7 @@
           <a:p>
             <a:fld id="{B541AD58-FDB1-E648-B24C-BDECB6C800BE}" type="datetimeFigureOut">
               <a:rPr lang="en-US" smtClean="0"/>
-              <a:t>8/13/21</a:t>
+              <a:t>8/30/21</a:t>
             </a:fld>
             <a:endParaRPr lang="en-US"/>
           </a:p>
@@ -3125,7 +3125,7 @@
           <a:p>
             <a:fld id="{B541AD58-FDB1-E648-B24C-BDECB6C800BE}" type="datetimeFigureOut">
               <a:rPr lang="en-US" smtClean="0"/>
-              <a:t>8/13/21</a:t>
+              <a:t>8/30/21</a:t>
             </a:fld>
             <a:endParaRPr lang="en-US"/>
           </a:p>
@@ -3378,7 +3378,7 @@
           <a:p>
             <a:fld id="{B541AD58-FDB1-E648-B24C-BDECB6C800BE}" type="datetimeFigureOut">
               <a:rPr lang="en-US" smtClean="0"/>
-              <a:t>8/13/21</a:t>
+              <a:t>8/30/21</a:t>
             </a:fld>
             <a:endParaRPr lang="en-US"/>
           </a:p>
@@ -3591,7 +3591,7 @@
           <a:p>
             <a:fld id="{B541AD58-FDB1-E648-B24C-BDECB6C800BE}" type="datetimeFigureOut">
               <a:rPr lang="en-US" smtClean="0"/>
-              <a:t>8/13/21</a:t>
+              <a:t>8/30/21</a:t>
             </a:fld>
             <a:endParaRPr lang="en-US"/>
           </a:p>
@@ -25703,7 +25703,7 @@
         <p:spPr>
           <a:xfrm>
             <a:off x="1749814" y="6179070"/>
-            <a:ext cx="3905712" cy="646331"/>
+            <a:ext cx="2880491" cy="646331"/>
           </a:xfrm>
           <a:prstGeom prst="rect">
             <a:avLst/>
@@ -25720,7 +25720,11 @@
           <a:p>
             <a:r>
               <a:rPr lang="en-US" sz="3600" b="1" dirty="0" smtClean="0"/>
-              <a:t>Straighten valid cut</a:t>
+              <a:t>Straighten </a:t>
+            </a:r>
+            <a:r>
+              <a:rPr lang="en-US" sz="3600" b="1" dirty="0" smtClean="0"/>
+              <a:t>cut</a:t>
             </a:r>
             <a:endParaRPr lang="en-US" sz="3600" b="1" dirty="0"/>
           </a:p>
@@ -25735,7 +25739,7 @@
         <p:spPr>
           <a:xfrm>
             <a:off x="5020757" y="-41835"/>
-            <a:ext cx="3905712" cy="646331"/>
+            <a:ext cx="2984862" cy="646331"/>
           </a:xfrm>
           <a:prstGeom prst="rect">
             <a:avLst/>
@@ -25752,7 +25756,11 @@
           <a:p>
             <a:r>
               <a:rPr lang="en-US" sz="3600" b="1" dirty="0" smtClean="0"/>
-              <a:t>Straighten valid cut</a:t>
+              <a:t>Straighten </a:t>
+            </a:r>
+            <a:r>
+              <a:rPr lang="en-US" sz="3600" b="1" dirty="0" smtClean="0"/>
+              <a:t>cut</a:t>
             </a:r>
             <a:endParaRPr lang="en-US" sz="3600" b="1" dirty="0"/>
           </a:p>

</xml_diff>

<commit_message>
Added self test diagram to Snapshot Introduction.
</commit_message>
<xml_diff>
--- a/TimelineDiagrams/TimelineDiagrams.pptx
+++ b/TimelineDiagrams/TimelineDiagrams.pptx
@@ -5,7 +5,7 @@
     <p:sldMasterId id="2147483648" r:id="rId1"/>
   </p:sldMasterIdLst>
   <p:notesMasterIdLst>
-    <p:notesMasterId r:id="rId17"/>
+    <p:notesMasterId r:id="rId19"/>
   </p:notesMasterIdLst>
   <p:sldIdLst>
     <p:sldId id="258" r:id="rId2"/>
@@ -23,6 +23,8 @@
     <p:sldId id="272" r:id="rId14"/>
     <p:sldId id="273" r:id="rId15"/>
     <p:sldId id="274" r:id="rId16"/>
+    <p:sldId id="275" r:id="rId17"/>
+    <p:sldId id="276" r:id="rId18"/>
   </p:sldIdLst>
   <p:sldSz cx="9144000" cy="6858000" type="screen4x3"/>
   <p:notesSz cx="6858000" cy="9144000"/>
@@ -15657,6 +15659,2703 @@
   <p:clrMapOvr>
     <a:masterClrMapping/>
   </p:clrMapOvr>
+</p:sld>
+</file>
+
+<file path=ppt/slides/slide16.xml><?xml version="1.0" encoding="utf-8"?>
+<p:sld xmlns:a="http://schemas.openxmlformats.org/drawingml/2006/main" xmlns:r="http://schemas.openxmlformats.org/officeDocument/2006/relationships" xmlns:p="http://schemas.openxmlformats.org/presentationml/2006/main">
+  <p:cSld>
+    <p:spTree>
+      <p:nvGrpSpPr>
+        <p:cNvPr id="1" name=""/>
+        <p:cNvGrpSpPr/>
+        <p:nvPr/>
+      </p:nvGrpSpPr>
+      <p:grpSpPr>
+        <a:xfrm>
+          <a:off x="0" y="0"/>
+          <a:ext cx="0" cy="0"/>
+          <a:chOff x="0" y="0"/>
+          <a:chExt cx="0" cy="0"/>
+        </a:xfrm>
+      </p:grpSpPr>
+      <p:cxnSp>
+        <p:nvCxnSpPr>
+          <p:cNvPr id="2" name="Straight Arrow Connector 1"/>
+          <p:cNvCxnSpPr/>
+          <p:nvPr/>
+        </p:nvCxnSpPr>
+        <p:spPr>
+          <a:xfrm>
+            <a:off x="184727" y="1110673"/>
+            <a:ext cx="8490350" cy="0"/>
+          </a:xfrm>
+          <a:prstGeom prst="straightConnector1">
+            <a:avLst/>
+          </a:prstGeom>
+          <a:ln w="76200" cmpd="sng">
+            <a:solidFill>
+              <a:srgbClr val="FF0000"/>
+            </a:solidFill>
+            <a:tailEnd type="arrow"/>
+          </a:ln>
+        </p:spPr>
+        <p:style>
+          <a:lnRef idx="2">
+            <a:schemeClr val="accent1"/>
+          </a:lnRef>
+          <a:fillRef idx="0">
+            <a:schemeClr val="accent1"/>
+          </a:fillRef>
+          <a:effectRef idx="1">
+            <a:schemeClr val="accent1"/>
+          </a:effectRef>
+          <a:fontRef idx="minor">
+            <a:schemeClr val="tx1"/>
+          </a:fontRef>
+        </p:style>
+      </p:cxnSp>
+      <p:cxnSp>
+        <p:nvCxnSpPr>
+          <p:cNvPr id="4" name="Straight Arrow Connector 3"/>
+          <p:cNvCxnSpPr/>
+          <p:nvPr/>
+        </p:nvCxnSpPr>
+        <p:spPr>
+          <a:xfrm>
+            <a:off x="184727" y="1725069"/>
+            <a:ext cx="8490350" cy="0"/>
+          </a:xfrm>
+          <a:prstGeom prst="straightConnector1">
+            <a:avLst/>
+          </a:prstGeom>
+          <a:ln w="76200" cmpd="sng">
+            <a:solidFill>
+              <a:srgbClr val="FF0000"/>
+            </a:solidFill>
+            <a:tailEnd type="arrow"/>
+          </a:ln>
+        </p:spPr>
+        <p:style>
+          <a:lnRef idx="2">
+            <a:schemeClr val="accent1"/>
+          </a:lnRef>
+          <a:fillRef idx="0">
+            <a:schemeClr val="accent1"/>
+          </a:fillRef>
+          <a:effectRef idx="1">
+            <a:schemeClr val="accent1"/>
+          </a:effectRef>
+          <a:fontRef idx="minor">
+            <a:schemeClr val="tx1"/>
+          </a:fontRef>
+        </p:style>
+      </p:cxnSp>
+      <p:cxnSp>
+        <p:nvCxnSpPr>
+          <p:cNvPr id="5" name="Straight Arrow Connector 4"/>
+          <p:cNvCxnSpPr/>
+          <p:nvPr/>
+        </p:nvCxnSpPr>
+        <p:spPr>
+          <a:xfrm>
+            <a:off x="184727" y="2177474"/>
+            <a:ext cx="8490350" cy="0"/>
+          </a:xfrm>
+          <a:prstGeom prst="straightConnector1">
+            <a:avLst/>
+          </a:prstGeom>
+          <a:ln w="76200" cmpd="sng">
+            <a:solidFill>
+              <a:srgbClr val="FF0000"/>
+            </a:solidFill>
+            <a:tailEnd type="arrow"/>
+          </a:ln>
+        </p:spPr>
+        <p:style>
+          <a:lnRef idx="2">
+            <a:schemeClr val="accent1"/>
+          </a:lnRef>
+          <a:fillRef idx="0">
+            <a:schemeClr val="accent1"/>
+          </a:fillRef>
+          <a:effectRef idx="1">
+            <a:schemeClr val="accent1"/>
+          </a:effectRef>
+          <a:fontRef idx="minor">
+            <a:schemeClr val="tx1"/>
+          </a:fontRef>
+        </p:style>
+      </p:cxnSp>
+      <p:cxnSp>
+        <p:nvCxnSpPr>
+          <p:cNvPr id="6" name="Straight Arrow Connector 5"/>
+          <p:cNvCxnSpPr/>
+          <p:nvPr/>
+        </p:nvCxnSpPr>
+        <p:spPr>
+          <a:xfrm>
+            <a:off x="184727" y="2779257"/>
+            <a:ext cx="8490350" cy="0"/>
+          </a:xfrm>
+          <a:prstGeom prst="straightConnector1">
+            <a:avLst/>
+          </a:prstGeom>
+          <a:ln w="76200" cmpd="sng">
+            <a:solidFill>
+              <a:srgbClr val="FF0000"/>
+            </a:solidFill>
+            <a:tailEnd type="arrow"/>
+          </a:ln>
+        </p:spPr>
+        <p:style>
+          <a:lnRef idx="2">
+            <a:schemeClr val="accent1"/>
+          </a:lnRef>
+          <a:fillRef idx="0">
+            <a:schemeClr val="accent1"/>
+          </a:fillRef>
+          <a:effectRef idx="1">
+            <a:schemeClr val="accent1"/>
+          </a:effectRef>
+          <a:fontRef idx="minor">
+            <a:schemeClr val="tx1"/>
+          </a:fontRef>
+        </p:style>
+      </p:cxnSp>
+      <p:cxnSp>
+        <p:nvCxnSpPr>
+          <p:cNvPr id="7" name="Straight Arrow Connector 6"/>
+          <p:cNvCxnSpPr/>
+          <p:nvPr/>
+        </p:nvCxnSpPr>
+        <p:spPr>
+          <a:xfrm>
+            <a:off x="184727" y="3420119"/>
+            <a:ext cx="8490350" cy="0"/>
+          </a:xfrm>
+          <a:prstGeom prst="straightConnector1">
+            <a:avLst/>
+          </a:prstGeom>
+          <a:ln w="76200" cmpd="sng">
+            <a:solidFill>
+              <a:srgbClr val="FF0000"/>
+            </a:solidFill>
+            <a:tailEnd type="arrow"/>
+          </a:ln>
+        </p:spPr>
+        <p:style>
+          <a:lnRef idx="2">
+            <a:schemeClr val="accent1"/>
+          </a:lnRef>
+          <a:fillRef idx="0">
+            <a:schemeClr val="accent1"/>
+          </a:fillRef>
+          <a:effectRef idx="1">
+            <a:schemeClr val="accent1"/>
+          </a:effectRef>
+          <a:fontRef idx="minor">
+            <a:schemeClr val="tx1"/>
+          </a:fontRef>
+        </p:style>
+      </p:cxnSp>
+      <p:cxnSp>
+        <p:nvCxnSpPr>
+          <p:cNvPr id="8" name="Straight Arrow Connector 7"/>
+          <p:cNvCxnSpPr/>
+          <p:nvPr/>
+        </p:nvCxnSpPr>
+        <p:spPr>
+          <a:xfrm>
+            <a:off x="184727" y="3963289"/>
+            <a:ext cx="8490350" cy="0"/>
+          </a:xfrm>
+          <a:prstGeom prst="straightConnector1">
+            <a:avLst/>
+          </a:prstGeom>
+          <a:ln w="76200" cmpd="sng">
+            <a:solidFill>
+              <a:srgbClr val="FF0000"/>
+            </a:solidFill>
+            <a:tailEnd type="arrow"/>
+          </a:ln>
+        </p:spPr>
+        <p:style>
+          <a:lnRef idx="2">
+            <a:schemeClr val="accent1"/>
+          </a:lnRef>
+          <a:fillRef idx="0">
+            <a:schemeClr val="accent1"/>
+          </a:fillRef>
+          <a:effectRef idx="1">
+            <a:schemeClr val="accent1"/>
+          </a:effectRef>
+          <a:fontRef idx="minor">
+            <a:schemeClr val="tx1"/>
+          </a:fontRef>
+        </p:style>
+      </p:cxnSp>
+      <p:cxnSp>
+        <p:nvCxnSpPr>
+          <p:cNvPr id="9" name="Straight Arrow Connector 8"/>
+          <p:cNvCxnSpPr/>
+          <p:nvPr/>
+        </p:nvCxnSpPr>
+        <p:spPr>
+          <a:xfrm>
+            <a:off x="184727" y="4506458"/>
+            <a:ext cx="8490350" cy="0"/>
+          </a:xfrm>
+          <a:prstGeom prst="straightConnector1">
+            <a:avLst/>
+          </a:prstGeom>
+          <a:ln w="76200" cmpd="sng">
+            <a:solidFill>
+              <a:srgbClr val="FF0000"/>
+            </a:solidFill>
+            <a:tailEnd type="arrow"/>
+          </a:ln>
+        </p:spPr>
+        <p:style>
+          <a:lnRef idx="2">
+            <a:schemeClr val="accent1"/>
+          </a:lnRef>
+          <a:fillRef idx="0">
+            <a:schemeClr val="accent1"/>
+          </a:fillRef>
+          <a:effectRef idx="1">
+            <a:schemeClr val="accent1"/>
+          </a:effectRef>
+          <a:fontRef idx="minor">
+            <a:schemeClr val="tx1"/>
+          </a:fontRef>
+        </p:style>
+      </p:cxnSp>
+      <p:cxnSp>
+        <p:nvCxnSpPr>
+          <p:cNvPr id="10" name="Straight Arrow Connector 9"/>
+          <p:cNvCxnSpPr/>
+          <p:nvPr/>
+        </p:nvCxnSpPr>
+        <p:spPr>
+          <a:xfrm>
+            <a:off x="184727" y="5069165"/>
+            <a:ext cx="8490350" cy="0"/>
+          </a:xfrm>
+          <a:prstGeom prst="straightConnector1">
+            <a:avLst/>
+          </a:prstGeom>
+          <a:ln w="76200" cmpd="sng">
+            <a:solidFill>
+              <a:srgbClr val="FF0000"/>
+            </a:solidFill>
+            <a:tailEnd type="arrow"/>
+          </a:ln>
+        </p:spPr>
+        <p:style>
+          <a:lnRef idx="2">
+            <a:schemeClr val="accent1"/>
+          </a:lnRef>
+          <a:fillRef idx="0">
+            <a:schemeClr val="accent1"/>
+          </a:fillRef>
+          <a:effectRef idx="1">
+            <a:schemeClr val="accent1"/>
+          </a:effectRef>
+          <a:fontRef idx="minor">
+            <a:schemeClr val="tx1"/>
+          </a:fontRef>
+        </p:style>
+      </p:cxnSp>
+      <p:cxnSp>
+        <p:nvCxnSpPr>
+          <p:cNvPr id="11" name="Straight Arrow Connector 10"/>
+          <p:cNvCxnSpPr/>
+          <p:nvPr/>
+        </p:nvCxnSpPr>
+        <p:spPr>
+          <a:xfrm>
+            <a:off x="184727" y="5495104"/>
+            <a:ext cx="8490350" cy="0"/>
+          </a:xfrm>
+          <a:prstGeom prst="straightConnector1">
+            <a:avLst/>
+          </a:prstGeom>
+          <a:ln w="76200" cmpd="sng">
+            <a:solidFill>
+              <a:srgbClr val="FF0000"/>
+            </a:solidFill>
+            <a:tailEnd type="arrow"/>
+          </a:ln>
+        </p:spPr>
+        <p:style>
+          <a:lnRef idx="2">
+            <a:schemeClr val="accent1"/>
+          </a:lnRef>
+          <a:fillRef idx="0">
+            <a:schemeClr val="accent1"/>
+          </a:fillRef>
+          <a:effectRef idx="1">
+            <a:schemeClr val="accent1"/>
+          </a:effectRef>
+          <a:fontRef idx="minor">
+            <a:schemeClr val="tx1"/>
+          </a:fontRef>
+        </p:style>
+      </p:cxnSp>
+      <p:sp>
+        <p:nvSpPr>
+          <p:cNvPr id="12" name="Oval 11"/>
+          <p:cNvSpPr/>
+          <p:nvPr/>
+        </p:nvSpPr>
+        <p:spPr>
+          <a:xfrm>
+            <a:off x="1289538" y="937846"/>
+            <a:ext cx="914400" cy="914400"/>
+          </a:xfrm>
+          <a:prstGeom prst="ellipse">
+            <a:avLst/>
+          </a:prstGeom>
+          <a:solidFill>
+            <a:schemeClr val="bg1"/>
+          </a:solidFill>
+        </p:spPr>
+        <p:style>
+          <a:lnRef idx="1">
+            <a:schemeClr val="accent1"/>
+          </a:lnRef>
+          <a:fillRef idx="3">
+            <a:schemeClr val="accent1"/>
+          </a:fillRef>
+          <a:effectRef idx="2">
+            <a:schemeClr val="accent1"/>
+          </a:effectRef>
+          <a:fontRef idx="minor">
+            <a:schemeClr val="lt1"/>
+          </a:fontRef>
+        </p:style>
+        <p:txBody>
+          <a:bodyPr rtlCol="0" anchor="ctr"/>
+          <a:lstStyle/>
+          <a:p>
+            <a:pPr algn="ctr"/>
+            <a:endParaRPr lang="en-US"/>
+          </a:p>
+        </p:txBody>
+      </p:sp>
+      <p:sp>
+        <p:nvSpPr>
+          <p:cNvPr id="13" name="TextBox 12"/>
+          <p:cNvSpPr txBox="1"/>
+          <p:nvPr/>
+        </p:nvSpPr>
+        <p:spPr>
+          <a:xfrm>
+            <a:off x="8193505" y="349009"/>
+            <a:ext cx="402674" cy="646331"/>
+          </a:xfrm>
+          <a:prstGeom prst="rect">
+            <a:avLst/>
+          </a:prstGeom>
+          <a:noFill/>
+        </p:spPr>
+        <p:txBody>
+          <a:bodyPr wrap="none" rtlCol="0">
+            <a:spAutoFit/>
+          </a:bodyPr>
+          <a:lstStyle/>
+          <a:p>
+            <a:r>
+              <a:rPr lang="en-US" sz="3600" b="1" dirty="0" smtClean="0"/>
+              <a:t>x</a:t>
+            </a:r>
+            <a:endParaRPr lang="en-US" sz="3600" b="1" dirty="0"/>
+          </a:p>
+        </p:txBody>
+      </p:sp>
+      <p:sp>
+        <p:nvSpPr>
+          <p:cNvPr id="15" name="TextBox 14"/>
+          <p:cNvSpPr txBox="1"/>
+          <p:nvPr/>
+        </p:nvSpPr>
+        <p:spPr>
+          <a:xfrm>
+            <a:off x="8557524" y="1159748"/>
+            <a:ext cx="403326" cy="646331"/>
+          </a:xfrm>
+          <a:prstGeom prst="rect">
+            <a:avLst/>
+          </a:prstGeom>
+          <a:noFill/>
+        </p:spPr>
+        <p:txBody>
+          <a:bodyPr wrap="none" rtlCol="0">
+            <a:spAutoFit/>
+          </a:bodyPr>
+          <a:lstStyle/>
+          <a:p>
+            <a:r>
+              <a:rPr lang="en-US" sz="3600" b="1" dirty="0"/>
+              <a:t>y</a:t>
+            </a:r>
+            <a:endParaRPr lang="en-US" sz="3600" b="1" dirty="0"/>
+          </a:p>
+        </p:txBody>
+      </p:sp>
+      <p:sp>
+        <p:nvSpPr>
+          <p:cNvPr id="16" name="TextBox 15"/>
+          <p:cNvSpPr txBox="1"/>
+          <p:nvPr/>
+        </p:nvSpPr>
+        <p:spPr>
+          <a:xfrm>
+            <a:off x="6053015" y="1531143"/>
+            <a:ext cx="2270048" cy="646331"/>
+          </a:xfrm>
+          <a:prstGeom prst="rect">
+            <a:avLst/>
+          </a:prstGeom>
+          <a:noFill/>
+        </p:spPr>
+        <p:txBody>
+          <a:bodyPr wrap="none" rtlCol="0">
+            <a:spAutoFit/>
+          </a:bodyPr>
+          <a:lstStyle/>
+          <a:p>
+            <a:r>
+              <a:rPr lang="en-US" sz="3600" b="1" dirty="0" err="1"/>
+              <a:t>m</a:t>
+            </a:r>
+            <a:r>
+              <a:rPr lang="en-US" sz="3600" b="1" dirty="0" err="1" smtClean="0"/>
+              <a:t>ax_value</a:t>
+            </a:r>
+            <a:endParaRPr lang="en-US" sz="3600" b="1" dirty="0"/>
+          </a:p>
+        </p:txBody>
+      </p:sp>
+      <p:sp>
+        <p:nvSpPr>
+          <p:cNvPr id="17" name="TextBox 16"/>
+          <p:cNvSpPr txBox="1"/>
+          <p:nvPr/>
+        </p:nvSpPr>
+        <p:spPr>
+          <a:xfrm>
+            <a:off x="6405029" y="2108025"/>
+            <a:ext cx="2191150" cy="646331"/>
+          </a:xfrm>
+          <a:prstGeom prst="rect">
+            <a:avLst/>
+          </a:prstGeom>
+          <a:noFill/>
+        </p:spPr>
+        <p:txBody>
+          <a:bodyPr wrap="none" rtlCol="0">
+            <a:spAutoFit/>
+          </a:bodyPr>
+          <a:lstStyle/>
+          <a:p>
+            <a:r>
+              <a:rPr lang="en-US" sz="3600" b="1" dirty="0" err="1" smtClean="0"/>
+              <a:t>min_value</a:t>
+            </a:r>
+            <a:endParaRPr lang="en-US" sz="3600" b="1" dirty="0"/>
+          </a:p>
+        </p:txBody>
+      </p:sp>
+      <p:sp>
+        <p:nvSpPr>
+          <p:cNvPr id="18" name="TextBox 17"/>
+          <p:cNvSpPr txBox="1"/>
+          <p:nvPr/>
+        </p:nvSpPr>
+        <p:spPr>
+          <a:xfrm>
+            <a:off x="7230847" y="2863204"/>
+            <a:ext cx="1092216" cy="646331"/>
+          </a:xfrm>
+          <a:prstGeom prst="rect">
+            <a:avLst/>
+          </a:prstGeom>
+          <a:noFill/>
+        </p:spPr>
+        <p:txBody>
+          <a:bodyPr wrap="none" rtlCol="0">
+            <a:spAutoFit/>
+          </a:bodyPr>
+          <a:lstStyle/>
+          <a:p>
+            <a:r>
+              <a:rPr lang="en-US" sz="3600" b="1" dirty="0" smtClean="0"/>
+              <a:t>span</a:t>
+            </a:r>
+            <a:endParaRPr lang="en-US" sz="3600" b="1" dirty="0"/>
+          </a:p>
+        </p:txBody>
+      </p:sp>
+      <p:sp>
+        <p:nvSpPr>
+          <p:cNvPr id="19" name="TextBox 18"/>
+          <p:cNvSpPr txBox="1"/>
+          <p:nvPr/>
+        </p:nvSpPr>
+        <p:spPr>
+          <a:xfrm>
+            <a:off x="7471548" y="3843893"/>
+            <a:ext cx="851515" cy="646331"/>
+          </a:xfrm>
+          <a:prstGeom prst="rect">
+            <a:avLst/>
+          </a:prstGeom>
+          <a:noFill/>
+        </p:spPr>
+        <p:txBody>
+          <a:bodyPr wrap="none" rtlCol="0">
+            <a:spAutoFit/>
+          </a:bodyPr>
+          <a:lstStyle/>
+          <a:p>
+            <a:r>
+              <a:rPr lang="en-US" sz="3600" b="1" dirty="0" err="1" smtClean="0"/>
+              <a:t>avg</a:t>
+            </a:r>
+            <a:endParaRPr lang="en-US" sz="3600" b="1" dirty="0"/>
+          </a:p>
+        </p:txBody>
+      </p:sp>
+      <p:sp>
+        <p:nvSpPr>
+          <p:cNvPr id="20" name="TextBox 19"/>
+          <p:cNvSpPr txBox="1"/>
+          <p:nvPr/>
+        </p:nvSpPr>
+        <p:spPr>
+          <a:xfrm>
+            <a:off x="6889797" y="4422834"/>
+            <a:ext cx="795110" cy="646331"/>
+          </a:xfrm>
+          <a:prstGeom prst="rect">
+            <a:avLst/>
+          </a:prstGeom>
+          <a:noFill/>
+        </p:spPr>
+        <p:txBody>
+          <a:bodyPr wrap="none" rtlCol="0">
+            <a:spAutoFit/>
+          </a:bodyPr>
+          <a:lstStyle/>
+          <a:p>
+            <a:r>
+              <a:rPr lang="en-US" sz="3600" b="1" dirty="0" err="1" smtClean="0"/>
+              <a:t>var</a:t>
+            </a:r>
+            <a:endParaRPr lang="en-US" sz="3600" b="1" dirty="0"/>
+          </a:p>
+        </p:txBody>
+      </p:sp>
+      <p:sp>
+        <p:nvSpPr>
+          <p:cNvPr id="21" name="TextBox 20"/>
+          <p:cNvSpPr txBox="1"/>
+          <p:nvPr/>
+        </p:nvSpPr>
+        <p:spPr>
+          <a:xfrm>
+            <a:off x="7552096" y="4848773"/>
+            <a:ext cx="825867" cy="646331"/>
+          </a:xfrm>
+          <a:prstGeom prst="rect">
+            <a:avLst/>
+          </a:prstGeom>
+          <a:noFill/>
+        </p:spPr>
+        <p:txBody>
+          <a:bodyPr wrap="none" rtlCol="0">
+            <a:spAutoFit/>
+          </a:bodyPr>
+          <a:lstStyle/>
+          <a:p>
+            <a:r>
+              <a:rPr lang="en-US" sz="3600" b="1" dirty="0" smtClean="0"/>
+              <a:t>diff</a:t>
+            </a:r>
+            <a:endParaRPr lang="en-US" sz="3600" b="1" dirty="0"/>
+          </a:p>
+        </p:txBody>
+      </p:sp>
+      <p:sp>
+        <p:nvSpPr>
+          <p:cNvPr id="22" name="TextBox 21"/>
+          <p:cNvSpPr txBox="1"/>
+          <p:nvPr/>
+        </p:nvSpPr>
+        <p:spPr>
+          <a:xfrm>
+            <a:off x="5858921" y="3408823"/>
+            <a:ext cx="2626215" cy="646331"/>
+          </a:xfrm>
+          <a:prstGeom prst="rect">
+            <a:avLst/>
+          </a:prstGeom>
+          <a:noFill/>
+        </p:spPr>
+        <p:txBody>
+          <a:bodyPr wrap="none" rtlCol="0">
+            <a:spAutoFit/>
+          </a:bodyPr>
+          <a:lstStyle/>
+          <a:p>
+            <a:r>
+              <a:rPr lang="en-US" sz="3600" b="1" dirty="0" err="1"/>
+              <a:t>s</a:t>
+            </a:r>
+            <a:r>
+              <a:rPr lang="en-US" sz="3600" b="1" dirty="0" err="1" smtClean="0"/>
+              <a:t>pan_square</a:t>
+            </a:r>
+            <a:endParaRPr lang="en-US" sz="3600" b="1" dirty="0"/>
+          </a:p>
+        </p:txBody>
+      </p:sp>
+      <p:sp>
+        <p:nvSpPr>
+          <p:cNvPr id="23" name="Oval 22"/>
+          <p:cNvSpPr>
+            <a:spLocks noChangeAspect="1"/>
+          </p:cNvSpPr>
+          <p:nvPr/>
+        </p:nvSpPr>
+        <p:spPr>
+          <a:xfrm>
+            <a:off x="2808849" y="2623840"/>
+            <a:ext cx="548640" cy="548640"/>
+          </a:xfrm>
+          <a:prstGeom prst="ellipse">
+            <a:avLst/>
+          </a:prstGeom>
+          <a:solidFill>
+            <a:schemeClr val="bg1"/>
+          </a:solidFill>
+        </p:spPr>
+        <p:style>
+          <a:lnRef idx="1">
+            <a:schemeClr val="accent1"/>
+          </a:lnRef>
+          <a:fillRef idx="3">
+            <a:schemeClr val="accent1"/>
+          </a:fillRef>
+          <a:effectRef idx="2">
+            <a:schemeClr val="accent1"/>
+          </a:effectRef>
+          <a:fontRef idx="minor">
+            <a:schemeClr val="lt1"/>
+          </a:fontRef>
+        </p:style>
+        <p:txBody>
+          <a:bodyPr rtlCol="0" anchor="ctr"/>
+          <a:lstStyle/>
+          <a:p>
+            <a:pPr algn="ctr"/>
+            <a:endParaRPr lang="en-US"/>
+          </a:p>
+        </p:txBody>
+      </p:sp>
+      <p:sp>
+        <p:nvSpPr>
+          <p:cNvPr id="24" name="Oval 23"/>
+          <p:cNvSpPr>
+            <a:spLocks noChangeAspect="1"/>
+          </p:cNvSpPr>
+          <p:nvPr/>
+        </p:nvSpPr>
+        <p:spPr>
+          <a:xfrm>
+            <a:off x="2808849" y="1970456"/>
+            <a:ext cx="548640" cy="548640"/>
+          </a:xfrm>
+          <a:prstGeom prst="ellipse">
+            <a:avLst/>
+          </a:prstGeom>
+          <a:solidFill>
+            <a:schemeClr val="bg1"/>
+          </a:solidFill>
+        </p:spPr>
+        <p:style>
+          <a:lnRef idx="1">
+            <a:schemeClr val="accent1"/>
+          </a:lnRef>
+          <a:fillRef idx="3">
+            <a:schemeClr val="accent1"/>
+          </a:fillRef>
+          <a:effectRef idx="2">
+            <a:schemeClr val="accent1"/>
+          </a:effectRef>
+          <a:fontRef idx="minor">
+            <a:schemeClr val="lt1"/>
+          </a:fontRef>
+        </p:style>
+        <p:txBody>
+          <a:bodyPr rtlCol="0" anchor="ctr"/>
+          <a:lstStyle/>
+          <a:p>
+            <a:pPr algn="ctr"/>
+            <a:endParaRPr lang="en-US"/>
+          </a:p>
+        </p:txBody>
+      </p:sp>
+      <p:sp>
+        <p:nvSpPr>
+          <p:cNvPr id="25" name="Oval 24"/>
+          <p:cNvSpPr>
+            <a:spLocks noChangeAspect="1"/>
+          </p:cNvSpPr>
+          <p:nvPr/>
+        </p:nvSpPr>
+        <p:spPr>
+          <a:xfrm>
+            <a:off x="4153095" y="3145799"/>
+            <a:ext cx="548640" cy="548640"/>
+          </a:xfrm>
+          <a:prstGeom prst="ellipse">
+            <a:avLst/>
+          </a:prstGeom>
+          <a:solidFill>
+            <a:schemeClr val="bg1"/>
+          </a:solidFill>
+        </p:spPr>
+        <p:style>
+          <a:lnRef idx="1">
+            <a:schemeClr val="accent1"/>
+          </a:lnRef>
+          <a:fillRef idx="3">
+            <a:schemeClr val="accent1"/>
+          </a:fillRef>
+          <a:effectRef idx="2">
+            <a:schemeClr val="accent1"/>
+          </a:effectRef>
+          <a:fontRef idx="minor">
+            <a:schemeClr val="lt1"/>
+          </a:fontRef>
+        </p:style>
+        <p:txBody>
+          <a:bodyPr rtlCol="0" anchor="ctr"/>
+          <a:lstStyle/>
+          <a:p>
+            <a:pPr algn="ctr"/>
+            <a:endParaRPr lang="en-US"/>
+          </a:p>
+        </p:txBody>
+      </p:sp>
+      <p:sp>
+        <p:nvSpPr>
+          <p:cNvPr id="26" name="Oval 25"/>
+          <p:cNvSpPr>
+            <a:spLocks noChangeAspect="1"/>
+          </p:cNvSpPr>
+          <p:nvPr/>
+        </p:nvSpPr>
+        <p:spPr>
+          <a:xfrm>
+            <a:off x="4854135" y="3572519"/>
+            <a:ext cx="548640" cy="548640"/>
+          </a:xfrm>
+          <a:prstGeom prst="ellipse">
+            <a:avLst/>
+          </a:prstGeom>
+          <a:solidFill>
+            <a:schemeClr val="bg1"/>
+          </a:solidFill>
+        </p:spPr>
+        <p:style>
+          <a:lnRef idx="1">
+            <a:schemeClr val="accent1"/>
+          </a:lnRef>
+          <a:fillRef idx="3">
+            <a:schemeClr val="accent1"/>
+          </a:fillRef>
+          <a:effectRef idx="2">
+            <a:schemeClr val="accent1"/>
+          </a:effectRef>
+          <a:fontRef idx="minor">
+            <a:schemeClr val="lt1"/>
+          </a:fontRef>
+        </p:style>
+        <p:txBody>
+          <a:bodyPr rtlCol="0" anchor="ctr"/>
+          <a:lstStyle/>
+          <a:p>
+            <a:pPr algn="ctr"/>
+            <a:endParaRPr lang="en-US"/>
+          </a:p>
+        </p:txBody>
+      </p:sp>
+    </p:spTree>
+    <p:extLst>
+      <p:ext uri="{BB962C8B-B14F-4D97-AF65-F5344CB8AC3E}">
+        <p14:creationId xmlns:p14="http://schemas.microsoft.com/office/powerpoint/2010/main" val="2846150758"/>
+      </p:ext>
+    </p:extLst>
+  </p:cSld>
+  <p:clrMapOvr>
+    <a:masterClrMapping/>
+  </p:clrMapOvr>
+</p:sld>
+</file>
+
+<file path=ppt/slides/slide17.xml><?xml version="1.0" encoding="utf-8"?>
+<p:sld xmlns:a="http://schemas.openxmlformats.org/drawingml/2006/main" xmlns:r="http://schemas.openxmlformats.org/officeDocument/2006/relationships" xmlns:p="http://schemas.openxmlformats.org/presentationml/2006/main">
+  <p:cSld>
+    <p:spTree>
+      <p:nvGrpSpPr>
+        <p:cNvPr id="1" name=""/>
+        <p:cNvGrpSpPr/>
+        <p:nvPr/>
+      </p:nvGrpSpPr>
+      <p:grpSpPr>
+        <a:xfrm>
+          <a:off x="0" y="0"/>
+          <a:ext cx="0" cy="0"/>
+          <a:chOff x="0" y="0"/>
+          <a:chExt cx="0" cy="0"/>
+        </a:xfrm>
+      </p:grpSpPr>
+      <p:sp>
+        <p:nvSpPr>
+          <p:cNvPr id="2" name="Oval 1"/>
+          <p:cNvSpPr/>
+          <p:nvPr/>
+        </p:nvSpPr>
+        <p:spPr>
+          <a:xfrm>
+            <a:off x="1284347" y="2662669"/>
+            <a:ext cx="914400" cy="914400"/>
+          </a:xfrm>
+          <a:prstGeom prst="ellipse">
+            <a:avLst/>
+          </a:prstGeom>
+          <a:noFill/>
+          <a:ln w="57150" cmpd="sng"/>
+        </p:spPr>
+        <p:style>
+          <a:lnRef idx="1">
+            <a:schemeClr val="accent1"/>
+          </a:lnRef>
+          <a:fillRef idx="3">
+            <a:schemeClr val="accent1"/>
+          </a:fillRef>
+          <a:effectRef idx="2">
+            <a:schemeClr val="accent1"/>
+          </a:effectRef>
+          <a:fontRef idx="minor">
+            <a:schemeClr val="lt1"/>
+          </a:fontRef>
+        </p:style>
+        <p:txBody>
+          <a:bodyPr rtlCol="0" anchor="ctr"/>
+          <a:lstStyle/>
+          <a:p>
+            <a:pPr algn="ctr"/>
+            <a:r>
+              <a:rPr lang="en-US" sz="3200" b="1" dirty="0">
+                <a:solidFill>
+                  <a:srgbClr val="FF0000"/>
+                </a:solidFill>
+              </a:rPr>
+              <a:t>1</a:t>
+            </a:r>
+            <a:endParaRPr lang="en-US" sz="3200" b="1" dirty="0">
+              <a:solidFill>
+                <a:srgbClr val="FF0000"/>
+              </a:solidFill>
+            </a:endParaRPr>
+          </a:p>
+        </p:txBody>
+      </p:sp>
+      <p:sp>
+        <p:nvSpPr>
+          <p:cNvPr id="3" name="Oval 2"/>
+          <p:cNvSpPr/>
+          <p:nvPr/>
+        </p:nvSpPr>
+        <p:spPr>
+          <a:xfrm>
+            <a:off x="7168764" y="3909291"/>
+            <a:ext cx="914400" cy="914400"/>
+          </a:xfrm>
+          <a:prstGeom prst="ellipse">
+            <a:avLst/>
+          </a:prstGeom>
+          <a:noFill/>
+          <a:ln w="57150" cmpd="sng"/>
+        </p:spPr>
+        <p:style>
+          <a:lnRef idx="1">
+            <a:schemeClr val="accent1"/>
+          </a:lnRef>
+          <a:fillRef idx="3">
+            <a:schemeClr val="accent1"/>
+          </a:fillRef>
+          <a:effectRef idx="2">
+            <a:schemeClr val="accent1"/>
+          </a:effectRef>
+          <a:fontRef idx="minor">
+            <a:schemeClr val="lt1"/>
+          </a:fontRef>
+        </p:style>
+        <p:txBody>
+          <a:bodyPr rtlCol="0" anchor="ctr"/>
+          <a:lstStyle/>
+          <a:p>
+            <a:pPr algn="ctr"/>
+            <a:r>
+              <a:rPr lang="en-US" sz="3200" b="1">
+                <a:solidFill>
+                  <a:srgbClr val="FF0000"/>
+                </a:solidFill>
+              </a:rPr>
+              <a:t>4</a:t>
+            </a:r>
+            <a:endParaRPr lang="en-US" sz="3200" b="1" dirty="0">
+              <a:solidFill>
+                <a:srgbClr val="FF0000"/>
+              </a:solidFill>
+            </a:endParaRPr>
+          </a:p>
+        </p:txBody>
+      </p:sp>
+      <p:sp>
+        <p:nvSpPr>
+          <p:cNvPr id="4" name="Oval 3"/>
+          <p:cNvSpPr/>
+          <p:nvPr/>
+        </p:nvSpPr>
+        <p:spPr>
+          <a:xfrm>
+            <a:off x="3505539" y="1484879"/>
+            <a:ext cx="914400" cy="914400"/>
+          </a:xfrm>
+          <a:prstGeom prst="ellipse">
+            <a:avLst/>
+          </a:prstGeom>
+          <a:noFill/>
+          <a:ln w="57150" cmpd="sng"/>
+        </p:spPr>
+        <p:style>
+          <a:lnRef idx="1">
+            <a:schemeClr val="accent1"/>
+          </a:lnRef>
+          <a:fillRef idx="3">
+            <a:schemeClr val="accent1"/>
+          </a:fillRef>
+          <a:effectRef idx="2">
+            <a:schemeClr val="accent1"/>
+          </a:effectRef>
+          <a:fontRef idx="minor">
+            <a:schemeClr val="lt1"/>
+          </a:fontRef>
+        </p:style>
+        <p:txBody>
+          <a:bodyPr rtlCol="0" anchor="ctr"/>
+          <a:lstStyle/>
+          <a:p>
+            <a:pPr algn="ctr"/>
+            <a:r>
+              <a:rPr lang="en-US" sz="3200" b="1" dirty="0">
+                <a:solidFill>
+                  <a:srgbClr val="FF0000"/>
+                </a:solidFill>
+              </a:rPr>
+              <a:t>2</a:t>
+            </a:r>
+            <a:endParaRPr lang="en-US" sz="3200" b="1" dirty="0">
+              <a:solidFill>
+                <a:srgbClr val="FF0000"/>
+              </a:solidFill>
+            </a:endParaRPr>
+          </a:p>
+        </p:txBody>
+      </p:sp>
+      <p:sp>
+        <p:nvSpPr>
+          <p:cNvPr id="5" name="Oval 4"/>
+          <p:cNvSpPr/>
+          <p:nvPr/>
+        </p:nvSpPr>
+        <p:spPr>
+          <a:xfrm>
+            <a:off x="5435939" y="5146964"/>
+            <a:ext cx="914400" cy="914400"/>
+          </a:xfrm>
+          <a:prstGeom prst="ellipse">
+            <a:avLst/>
+          </a:prstGeom>
+          <a:noFill/>
+          <a:ln w="57150" cmpd="sng"/>
+        </p:spPr>
+        <p:style>
+          <a:lnRef idx="1">
+            <a:schemeClr val="accent1"/>
+          </a:lnRef>
+          <a:fillRef idx="3">
+            <a:schemeClr val="accent1"/>
+          </a:fillRef>
+          <a:effectRef idx="2">
+            <a:schemeClr val="accent1"/>
+          </a:effectRef>
+          <a:fontRef idx="minor">
+            <a:schemeClr val="lt1"/>
+          </a:fontRef>
+        </p:style>
+        <p:txBody>
+          <a:bodyPr rtlCol="0" anchor="ctr"/>
+          <a:lstStyle/>
+          <a:p>
+            <a:pPr algn="ctr"/>
+            <a:r>
+              <a:rPr lang="en-US" sz="3200" b="1" dirty="0">
+                <a:solidFill>
+                  <a:srgbClr val="FF0000"/>
+                </a:solidFill>
+              </a:rPr>
+              <a:t>2</a:t>
+            </a:r>
+            <a:endParaRPr lang="en-US" sz="3200" b="1" dirty="0">
+              <a:solidFill>
+                <a:srgbClr val="FF0000"/>
+              </a:solidFill>
+            </a:endParaRPr>
+          </a:p>
+        </p:txBody>
+      </p:sp>
+      <p:cxnSp>
+        <p:nvCxnSpPr>
+          <p:cNvPr id="7" name="Straight Arrow Connector 6"/>
+          <p:cNvCxnSpPr>
+            <a:stCxn id="2" idx="6"/>
+          </p:cNvCxnSpPr>
+          <p:nvPr/>
+        </p:nvCxnSpPr>
+        <p:spPr>
+          <a:xfrm flipV="1">
+            <a:off x="2198747" y="3108323"/>
+            <a:ext cx="6742206" cy="11546"/>
+          </a:xfrm>
+          <a:prstGeom prst="straightConnector1">
+            <a:avLst/>
+          </a:prstGeom>
+          <a:ln w="76200" cmpd="sng">
+            <a:solidFill>
+              <a:srgbClr val="FF0000"/>
+            </a:solidFill>
+            <a:headEnd type="oval"/>
+            <a:tailEnd type="triangle"/>
+          </a:ln>
+        </p:spPr>
+        <p:style>
+          <a:lnRef idx="2">
+            <a:schemeClr val="accent1"/>
+          </a:lnRef>
+          <a:fillRef idx="0">
+            <a:schemeClr val="accent1"/>
+          </a:fillRef>
+          <a:effectRef idx="1">
+            <a:schemeClr val="accent1"/>
+          </a:effectRef>
+          <a:fontRef idx="minor">
+            <a:schemeClr val="tx1"/>
+          </a:fontRef>
+        </p:style>
+      </p:cxnSp>
+      <p:cxnSp>
+        <p:nvCxnSpPr>
+          <p:cNvPr id="9" name="Straight Arrow Connector 8"/>
+          <p:cNvCxnSpPr>
+            <a:stCxn id="4" idx="6"/>
+          </p:cNvCxnSpPr>
+          <p:nvPr/>
+        </p:nvCxnSpPr>
+        <p:spPr>
+          <a:xfrm>
+            <a:off x="4419939" y="1942079"/>
+            <a:ext cx="4262243" cy="0"/>
+          </a:xfrm>
+          <a:prstGeom prst="straightConnector1">
+            <a:avLst/>
+          </a:prstGeom>
+          <a:ln w="76200" cmpd="sng">
+            <a:solidFill>
+              <a:srgbClr val="FF0000"/>
+            </a:solidFill>
+            <a:headEnd type="oval"/>
+            <a:tailEnd type="triangle"/>
+          </a:ln>
+        </p:spPr>
+        <p:style>
+          <a:lnRef idx="2">
+            <a:schemeClr val="accent1"/>
+          </a:lnRef>
+          <a:fillRef idx="0">
+            <a:schemeClr val="accent1"/>
+          </a:fillRef>
+          <a:effectRef idx="1">
+            <a:schemeClr val="accent1"/>
+          </a:effectRef>
+          <a:fontRef idx="minor">
+            <a:schemeClr val="tx1"/>
+          </a:fontRef>
+        </p:style>
+      </p:cxnSp>
+      <p:cxnSp>
+        <p:nvCxnSpPr>
+          <p:cNvPr id="11" name="Straight Arrow Connector 10"/>
+          <p:cNvCxnSpPr>
+            <a:endCxn id="4" idx="2"/>
+          </p:cNvCxnSpPr>
+          <p:nvPr/>
+        </p:nvCxnSpPr>
+        <p:spPr>
+          <a:xfrm>
+            <a:off x="184727" y="1942079"/>
+            <a:ext cx="3320812" cy="0"/>
+          </a:xfrm>
+          <a:prstGeom prst="straightConnector1">
+            <a:avLst/>
+          </a:prstGeom>
+          <a:ln w="76200" cmpd="sng">
+            <a:solidFill>
+              <a:srgbClr val="FF0000"/>
+            </a:solidFill>
+            <a:tailEnd type="arrow"/>
+          </a:ln>
+        </p:spPr>
+        <p:style>
+          <a:lnRef idx="2">
+            <a:schemeClr val="accent1"/>
+          </a:lnRef>
+          <a:fillRef idx="0">
+            <a:schemeClr val="accent1"/>
+          </a:fillRef>
+          <a:effectRef idx="1">
+            <a:schemeClr val="accent1"/>
+          </a:effectRef>
+          <a:fontRef idx="minor">
+            <a:schemeClr val="tx1"/>
+          </a:fontRef>
+        </p:style>
+      </p:cxnSp>
+      <p:cxnSp>
+        <p:nvCxnSpPr>
+          <p:cNvPr id="16" name="Straight Arrow Connector 15"/>
+          <p:cNvCxnSpPr>
+            <a:endCxn id="3" idx="2"/>
+          </p:cNvCxnSpPr>
+          <p:nvPr/>
+        </p:nvCxnSpPr>
+        <p:spPr>
+          <a:xfrm>
+            <a:off x="184727" y="4313076"/>
+            <a:ext cx="6984037" cy="53415"/>
+          </a:xfrm>
+          <a:prstGeom prst="straightConnector1">
+            <a:avLst/>
+          </a:prstGeom>
+          <a:ln w="76200" cmpd="sng">
+            <a:solidFill>
+              <a:srgbClr val="FF0000"/>
+            </a:solidFill>
+            <a:tailEnd type="arrow"/>
+          </a:ln>
+        </p:spPr>
+        <p:style>
+          <a:lnRef idx="2">
+            <a:schemeClr val="accent1"/>
+          </a:lnRef>
+          <a:fillRef idx="0">
+            <a:schemeClr val="accent1"/>
+          </a:fillRef>
+          <a:effectRef idx="1">
+            <a:schemeClr val="accent1"/>
+          </a:effectRef>
+          <a:fontRef idx="minor">
+            <a:schemeClr val="tx1"/>
+          </a:fontRef>
+        </p:style>
+      </p:cxnSp>
+      <p:cxnSp>
+        <p:nvCxnSpPr>
+          <p:cNvPr id="19" name="Straight Arrow Connector 18"/>
+          <p:cNvCxnSpPr>
+            <a:stCxn id="3" idx="6"/>
+          </p:cNvCxnSpPr>
+          <p:nvPr/>
+        </p:nvCxnSpPr>
+        <p:spPr>
+          <a:xfrm>
+            <a:off x="8083164" y="4366491"/>
+            <a:ext cx="1047988" cy="0"/>
+          </a:xfrm>
+          <a:prstGeom prst="straightConnector1">
+            <a:avLst/>
+          </a:prstGeom>
+          <a:ln w="76200" cmpd="sng">
+            <a:solidFill>
+              <a:srgbClr val="FF0000"/>
+            </a:solidFill>
+            <a:headEnd type="oval"/>
+            <a:tailEnd type="triangle"/>
+          </a:ln>
+        </p:spPr>
+        <p:style>
+          <a:lnRef idx="2">
+            <a:schemeClr val="accent1"/>
+          </a:lnRef>
+          <a:fillRef idx="0">
+            <a:schemeClr val="accent1"/>
+          </a:fillRef>
+          <a:effectRef idx="1">
+            <a:schemeClr val="accent1"/>
+          </a:effectRef>
+          <a:fontRef idx="minor">
+            <a:schemeClr val="tx1"/>
+          </a:fontRef>
+        </p:style>
+      </p:cxnSp>
+      <p:cxnSp>
+        <p:nvCxnSpPr>
+          <p:cNvPr id="26" name="Straight Arrow Connector 25"/>
+          <p:cNvCxnSpPr>
+            <a:stCxn id="5" idx="6"/>
+          </p:cNvCxnSpPr>
+          <p:nvPr/>
+        </p:nvCxnSpPr>
+        <p:spPr>
+          <a:xfrm>
+            <a:off x="6350339" y="5604164"/>
+            <a:ext cx="2516570" cy="6927"/>
+          </a:xfrm>
+          <a:prstGeom prst="straightConnector1">
+            <a:avLst/>
+          </a:prstGeom>
+          <a:ln w="76200" cmpd="sng">
+            <a:solidFill>
+              <a:srgbClr val="FF0000"/>
+            </a:solidFill>
+            <a:headEnd type="oval"/>
+            <a:tailEnd type="triangle"/>
+          </a:ln>
+        </p:spPr>
+        <p:style>
+          <a:lnRef idx="2">
+            <a:schemeClr val="accent1"/>
+          </a:lnRef>
+          <a:fillRef idx="0">
+            <a:schemeClr val="accent1"/>
+          </a:fillRef>
+          <a:effectRef idx="1">
+            <a:schemeClr val="accent1"/>
+          </a:effectRef>
+          <a:fontRef idx="minor">
+            <a:schemeClr val="tx1"/>
+          </a:fontRef>
+        </p:style>
+      </p:cxnSp>
+      <p:cxnSp>
+        <p:nvCxnSpPr>
+          <p:cNvPr id="28" name="Straight Arrow Connector 27"/>
+          <p:cNvCxnSpPr>
+            <a:stCxn id="5" idx="2"/>
+          </p:cNvCxnSpPr>
+          <p:nvPr/>
+        </p:nvCxnSpPr>
+        <p:spPr>
+          <a:xfrm flipH="1">
+            <a:off x="184727" y="5604164"/>
+            <a:ext cx="5251212" cy="8946"/>
+          </a:xfrm>
+          <a:prstGeom prst="straightConnector1">
+            <a:avLst/>
+          </a:prstGeom>
+          <a:ln w="76200" cmpd="sng">
+            <a:solidFill>
+              <a:srgbClr val="FF0000"/>
+            </a:solidFill>
+            <a:headEnd type="arrow"/>
+            <a:tailEnd type="none"/>
+          </a:ln>
+        </p:spPr>
+        <p:style>
+          <a:lnRef idx="2">
+            <a:schemeClr val="accent1"/>
+          </a:lnRef>
+          <a:fillRef idx="0">
+            <a:schemeClr val="accent1"/>
+          </a:fillRef>
+          <a:effectRef idx="1">
+            <a:schemeClr val="accent1"/>
+          </a:effectRef>
+          <a:fontRef idx="minor">
+            <a:schemeClr val="tx1"/>
+          </a:fontRef>
+        </p:style>
+      </p:cxnSp>
+      <p:cxnSp>
+        <p:nvCxnSpPr>
+          <p:cNvPr id="31" name="Straight Arrow Connector 30"/>
+          <p:cNvCxnSpPr>
+            <a:stCxn id="2" idx="2"/>
+          </p:cNvCxnSpPr>
+          <p:nvPr/>
+        </p:nvCxnSpPr>
+        <p:spPr>
+          <a:xfrm flipH="1">
+            <a:off x="258771" y="3119869"/>
+            <a:ext cx="1025576" cy="0"/>
+          </a:xfrm>
+          <a:prstGeom prst="straightConnector1">
+            <a:avLst/>
+          </a:prstGeom>
+          <a:ln w="76200" cmpd="sng">
+            <a:solidFill>
+              <a:srgbClr val="FF0000"/>
+            </a:solidFill>
+            <a:headEnd type="arrow"/>
+            <a:tailEnd type="none"/>
+          </a:ln>
+        </p:spPr>
+        <p:style>
+          <a:lnRef idx="2">
+            <a:schemeClr val="accent1"/>
+          </a:lnRef>
+          <a:fillRef idx="0">
+            <a:schemeClr val="accent1"/>
+          </a:fillRef>
+          <a:effectRef idx="1">
+            <a:schemeClr val="accent1"/>
+          </a:effectRef>
+          <a:fontRef idx="minor">
+            <a:schemeClr val="tx1"/>
+          </a:fontRef>
+        </p:style>
+      </p:cxnSp>
+      <p:cxnSp>
+        <p:nvCxnSpPr>
+          <p:cNvPr id="33" name="Straight Arrow Connector 32"/>
+          <p:cNvCxnSpPr>
+            <a:stCxn id="2" idx="7"/>
+            <a:endCxn id="4" idx="3"/>
+          </p:cNvCxnSpPr>
+          <p:nvPr/>
+        </p:nvCxnSpPr>
+        <p:spPr>
+          <a:xfrm flipV="1">
+            <a:off x="2064836" y="2265368"/>
+            <a:ext cx="1574614" cy="531212"/>
+          </a:xfrm>
+          <a:prstGeom prst="straightConnector1">
+            <a:avLst/>
+          </a:prstGeom>
+          <a:ln>
+            <a:tailEnd type="arrow"/>
+          </a:ln>
+        </p:spPr>
+        <p:style>
+          <a:lnRef idx="2">
+            <a:schemeClr val="accent1"/>
+          </a:lnRef>
+          <a:fillRef idx="0">
+            <a:schemeClr val="accent1"/>
+          </a:fillRef>
+          <a:effectRef idx="1">
+            <a:schemeClr val="accent1"/>
+          </a:effectRef>
+          <a:fontRef idx="minor">
+            <a:schemeClr val="tx1"/>
+          </a:fontRef>
+        </p:style>
+      </p:cxnSp>
+      <p:cxnSp>
+        <p:nvCxnSpPr>
+          <p:cNvPr id="36" name="Straight Arrow Connector 35"/>
+          <p:cNvCxnSpPr>
+            <a:stCxn id="2" idx="5"/>
+            <a:endCxn id="5" idx="1"/>
+          </p:cNvCxnSpPr>
+          <p:nvPr/>
+        </p:nvCxnSpPr>
+        <p:spPr>
+          <a:xfrm>
+            <a:off x="2064836" y="3443158"/>
+            <a:ext cx="3505014" cy="1837717"/>
+          </a:xfrm>
+          <a:prstGeom prst="straightConnector1">
+            <a:avLst/>
+          </a:prstGeom>
+          <a:ln>
+            <a:tailEnd type="arrow"/>
+          </a:ln>
+        </p:spPr>
+        <p:style>
+          <a:lnRef idx="2">
+            <a:schemeClr val="accent1"/>
+          </a:lnRef>
+          <a:fillRef idx="0">
+            <a:schemeClr val="accent1"/>
+          </a:fillRef>
+          <a:effectRef idx="1">
+            <a:schemeClr val="accent1"/>
+          </a:effectRef>
+          <a:fontRef idx="minor">
+            <a:schemeClr val="tx1"/>
+          </a:fontRef>
+        </p:style>
+      </p:cxnSp>
+      <p:cxnSp>
+        <p:nvCxnSpPr>
+          <p:cNvPr id="39" name="Straight Arrow Connector 38"/>
+          <p:cNvCxnSpPr>
+            <a:stCxn id="37" idx="6"/>
+            <a:endCxn id="3" idx="1"/>
+          </p:cNvCxnSpPr>
+          <p:nvPr/>
+        </p:nvCxnSpPr>
+        <p:spPr>
+          <a:xfrm>
+            <a:off x="5334339" y="1115138"/>
+            <a:ext cx="1968336" cy="2928064"/>
+          </a:xfrm>
+          <a:prstGeom prst="straightConnector1">
+            <a:avLst/>
+          </a:prstGeom>
+          <a:ln>
+            <a:tailEnd type="arrow"/>
+          </a:ln>
+        </p:spPr>
+        <p:style>
+          <a:lnRef idx="2">
+            <a:schemeClr val="accent1"/>
+          </a:lnRef>
+          <a:fillRef idx="0">
+            <a:schemeClr val="accent1"/>
+          </a:fillRef>
+          <a:effectRef idx="1">
+            <a:schemeClr val="accent1"/>
+          </a:effectRef>
+          <a:fontRef idx="minor">
+            <a:schemeClr val="tx1"/>
+          </a:fontRef>
+        </p:style>
+      </p:cxnSp>
+      <p:cxnSp>
+        <p:nvCxnSpPr>
+          <p:cNvPr id="42" name="Straight Arrow Connector 41"/>
+          <p:cNvCxnSpPr>
+            <a:stCxn id="38" idx="0"/>
+            <a:endCxn id="3" idx="3"/>
+          </p:cNvCxnSpPr>
+          <p:nvPr/>
+        </p:nvCxnSpPr>
+        <p:spPr>
+          <a:xfrm flipV="1">
+            <a:off x="7059757" y="4689780"/>
+            <a:ext cx="242918" cy="1242275"/>
+          </a:xfrm>
+          <a:prstGeom prst="straightConnector1">
+            <a:avLst/>
+          </a:prstGeom>
+          <a:ln>
+            <a:tailEnd type="arrow"/>
+          </a:ln>
+        </p:spPr>
+        <p:style>
+          <a:lnRef idx="2">
+            <a:schemeClr val="accent1"/>
+          </a:lnRef>
+          <a:fillRef idx="0">
+            <a:schemeClr val="accent1"/>
+          </a:fillRef>
+          <a:effectRef idx="1">
+            <a:schemeClr val="accent1"/>
+          </a:effectRef>
+          <a:fontRef idx="minor">
+            <a:schemeClr val="tx1"/>
+          </a:fontRef>
+        </p:style>
+      </p:cxnSp>
+      <p:sp>
+        <p:nvSpPr>
+          <p:cNvPr id="43" name="TextBox 42"/>
+          <p:cNvSpPr txBox="1"/>
+          <p:nvPr/>
+        </p:nvSpPr>
+        <p:spPr>
+          <a:xfrm>
+            <a:off x="8302193" y="2235487"/>
+            <a:ext cx="556563" cy="584776"/>
+          </a:xfrm>
+          <a:prstGeom prst="rect">
+            <a:avLst/>
+          </a:prstGeom>
+          <a:noFill/>
+        </p:spPr>
+        <p:txBody>
+          <a:bodyPr wrap="none" rtlCol="0">
+            <a:spAutoFit/>
+          </a:bodyPr>
+          <a:lstStyle/>
+          <a:p>
+            <a:r>
+              <a:rPr lang="en-US" sz="3200" b="1" dirty="0" smtClean="0">
+                <a:solidFill>
+                  <a:srgbClr val="FF0000"/>
+                </a:solidFill>
+              </a:rPr>
+              <a:t>W</a:t>
+            </a:r>
+            <a:endParaRPr lang="en-US" sz="3200" b="1" dirty="0">
+              <a:solidFill>
+                <a:srgbClr val="FF0000"/>
+              </a:solidFill>
+            </a:endParaRPr>
+          </a:p>
+        </p:txBody>
+      </p:sp>
+      <p:sp>
+        <p:nvSpPr>
+          <p:cNvPr id="44" name="TextBox 43"/>
+          <p:cNvSpPr txBox="1"/>
+          <p:nvPr/>
+        </p:nvSpPr>
+        <p:spPr>
+          <a:xfrm>
+            <a:off x="8566629" y="3417761"/>
+            <a:ext cx="380833" cy="584776"/>
+          </a:xfrm>
+          <a:prstGeom prst="rect">
+            <a:avLst/>
+          </a:prstGeom>
+          <a:noFill/>
+        </p:spPr>
+        <p:txBody>
+          <a:bodyPr wrap="none" rtlCol="0">
+            <a:spAutoFit/>
+          </a:bodyPr>
+          <a:lstStyle/>
+          <a:p>
+            <a:r>
+              <a:rPr lang="en-US" sz="3200" b="1" dirty="0">
+                <a:solidFill>
+                  <a:srgbClr val="FF0000"/>
+                </a:solidFill>
+              </a:rPr>
+              <a:t>Z</a:t>
+            </a:r>
+          </a:p>
+        </p:txBody>
+      </p:sp>
+      <p:sp>
+        <p:nvSpPr>
+          <p:cNvPr id="45" name="TextBox 44"/>
+          <p:cNvSpPr txBox="1"/>
+          <p:nvPr/>
+        </p:nvSpPr>
+        <p:spPr>
+          <a:xfrm>
+            <a:off x="8374873" y="1115138"/>
+            <a:ext cx="410689" cy="584776"/>
+          </a:xfrm>
+          <a:prstGeom prst="rect">
+            <a:avLst/>
+          </a:prstGeom>
+          <a:noFill/>
+        </p:spPr>
+        <p:txBody>
+          <a:bodyPr wrap="none" rtlCol="0">
+            <a:spAutoFit/>
+          </a:bodyPr>
+          <a:lstStyle/>
+          <a:p>
+            <a:r>
+              <a:rPr lang="en-US" sz="3200" b="1" dirty="0">
+                <a:solidFill>
+                  <a:srgbClr val="FF0000"/>
+                </a:solidFill>
+              </a:rPr>
+              <a:t>X</a:t>
+            </a:r>
+          </a:p>
+        </p:txBody>
+      </p:sp>
+      <p:sp>
+        <p:nvSpPr>
+          <p:cNvPr id="46" name="TextBox 45"/>
+          <p:cNvSpPr txBox="1"/>
+          <p:nvPr/>
+        </p:nvSpPr>
+        <p:spPr>
+          <a:xfrm>
+            <a:off x="8474311" y="4689780"/>
+            <a:ext cx="415498" cy="584776"/>
+          </a:xfrm>
+          <a:prstGeom prst="rect">
+            <a:avLst/>
+          </a:prstGeom>
+          <a:noFill/>
+        </p:spPr>
+        <p:txBody>
+          <a:bodyPr wrap="none" rtlCol="0">
+            <a:spAutoFit/>
+          </a:bodyPr>
+          <a:lstStyle/>
+          <a:p>
+            <a:r>
+              <a:rPr lang="en-US" sz="3200" b="1" dirty="0" smtClean="0">
+                <a:solidFill>
+                  <a:srgbClr val="FF0000"/>
+                </a:solidFill>
+              </a:rPr>
+              <a:t>Y</a:t>
+            </a:r>
+            <a:endParaRPr lang="en-US" sz="3200" b="1" dirty="0">
+              <a:solidFill>
+                <a:srgbClr val="FF0000"/>
+              </a:solidFill>
+            </a:endParaRPr>
+          </a:p>
+        </p:txBody>
+      </p:sp>
+      <p:sp>
+        <p:nvSpPr>
+          <p:cNvPr id="49" name="TextBox 48"/>
+          <p:cNvSpPr txBox="1"/>
+          <p:nvPr/>
+        </p:nvSpPr>
+        <p:spPr>
+          <a:xfrm>
+            <a:off x="330600" y="1469963"/>
+            <a:ext cx="823062" cy="584776"/>
+          </a:xfrm>
+          <a:prstGeom prst="rect">
+            <a:avLst/>
+          </a:prstGeom>
+          <a:noFill/>
+        </p:spPr>
+        <p:txBody>
+          <a:bodyPr wrap="none" rtlCol="0">
+            <a:spAutoFit/>
+          </a:bodyPr>
+          <a:lstStyle/>
+          <a:p>
+            <a:r>
+              <a:rPr lang="en-US" sz="3200" b="1" dirty="0"/>
+              <a:t>X</a:t>
+            </a:r>
+            <a:r>
+              <a:rPr lang="en-US" sz="3200" b="1" dirty="0" smtClean="0"/>
+              <a:t>=0</a:t>
+            </a:r>
+            <a:endParaRPr lang="en-US" sz="3200" b="1" dirty="0"/>
+          </a:p>
+        </p:txBody>
+      </p:sp>
+      <p:sp>
+        <p:nvSpPr>
+          <p:cNvPr id="50" name="TextBox 49"/>
+          <p:cNvSpPr txBox="1"/>
+          <p:nvPr/>
+        </p:nvSpPr>
+        <p:spPr>
+          <a:xfrm>
+            <a:off x="258771" y="2493392"/>
+            <a:ext cx="968935" cy="584776"/>
+          </a:xfrm>
+          <a:prstGeom prst="rect">
+            <a:avLst/>
+          </a:prstGeom>
+          <a:noFill/>
+        </p:spPr>
+        <p:txBody>
+          <a:bodyPr wrap="none" rtlCol="0">
+            <a:spAutoFit/>
+          </a:bodyPr>
+          <a:lstStyle/>
+          <a:p>
+            <a:r>
+              <a:rPr lang="en-US" sz="3200" b="1" dirty="0"/>
+              <a:t>W</a:t>
+            </a:r>
+            <a:r>
+              <a:rPr lang="en-US" sz="3200" b="1" dirty="0" smtClean="0"/>
+              <a:t>=0</a:t>
+            </a:r>
+            <a:endParaRPr lang="en-US" sz="3200" b="1" dirty="0"/>
+          </a:p>
+        </p:txBody>
+      </p:sp>
+      <p:sp>
+        <p:nvSpPr>
+          <p:cNvPr id="51" name="TextBox 50"/>
+          <p:cNvSpPr txBox="1"/>
+          <p:nvPr/>
+        </p:nvSpPr>
+        <p:spPr>
+          <a:xfrm>
+            <a:off x="464789" y="3756315"/>
+            <a:ext cx="793206" cy="584776"/>
+          </a:xfrm>
+          <a:prstGeom prst="rect">
+            <a:avLst/>
+          </a:prstGeom>
+          <a:noFill/>
+        </p:spPr>
+        <p:txBody>
+          <a:bodyPr wrap="none" rtlCol="0">
+            <a:spAutoFit/>
+          </a:bodyPr>
+          <a:lstStyle/>
+          <a:p>
+            <a:r>
+              <a:rPr lang="en-US" sz="3200" b="1" dirty="0" smtClean="0"/>
+              <a:t>Z=0</a:t>
+            </a:r>
+            <a:endParaRPr lang="en-US" sz="3200" b="1" dirty="0"/>
+          </a:p>
+        </p:txBody>
+      </p:sp>
+      <p:sp>
+        <p:nvSpPr>
+          <p:cNvPr id="52" name="TextBox 51"/>
+          <p:cNvSpPr txBox="1"/>
+          <p:nvPr/>
+        </p:nvSpPr>
+        <p:spPr>
+          <a:xfrm>
+            <a:off x="330600" y="4959062"/>
+            <a:ext cx="823062" cy="584776"/>
+          </a:xfrm>
+          <a:prstGeom prst="rect">
+            <a:avLst/>
+          </a:prstGeom>
+          <a:noFill/>
+        </p:spPr>
+        <p:txBody>
+          <a:bodyPr wrap="none" rtlCol="0">
+            <a:spAutoFit/>
+          </a:bodyPr>
+          <a:lstStyle/>
+          <a:p>
+            <a:r>
+              <a:rPr lang="en-US" sz="3200" b="1" dirty="0" smtClean="0"/>
+              <a:t>Y=0</a:t>
+            </a:r>
+            <a:endParaRPr lang="en-US" sz="3200" b="1" dirty="0"/>
+          </a:p>
+        </p:txBody>
+      </p:sp>
+      <p:sp>
+        <p:nvSpPr>
+          <p:cNvPr id="53" name="TextBox 52"/>
+          <p:cNvSpPr txBox="1"/>
+          <p:nvPr/>
+        </p:nvSpPr>
+        <p:spPr>
+          <a:xfrm>
+            <a:off x="5158319" y="1408407"/>
+            <a:ext cx="823062" cy="584776"/>
+          </a:xfrm>
+          <a:prstGeom prst="rect">
+            <a:avLst/>
+          </a:prstGeom>
+          <a:noFill/>
+        </p:spPr>
+        <p:txBody>
+          <a:bodyPr wrap="none" rtlCol="0">
+            <a:spAutoFit/>
+          </a:bodyPr>
+          <a:lstStyle/>
+          <a:p>
+            <a:r>
+              <a:rPr lang="en-US" sz="3200" b="1" dirty="0" smtClean="0"/>
+              <a:t>X=2</a:t>
+            </a:r>
+            <a:endParaRPr lang="en-US" sz="3200" b="1" dirty="0"/>
+          </a:p>
+        </p:txBody>
+      </p:sp>
+      <p:sp>
+        <p:nvSpPr>
+          <p:cNvPr id="56" name="TextBox 55"/>
+          <p:cNvSpPr txBox="1"/>
+          <p:nvPr/>
+        </p:nvSpPr>
+        <p:spPr>
+          <a:xfrm>
+            <a:off x="2124703" y="2061576"/>
+            <a:ext cx="968935" cy="584776"/>
+          </a:xfrm>
+          <a:prstGeom prst="rect">
+            <a:avLst/>
+          </a:prstGeom>
+          <a:noFill/>
+        </p:spPr>
+        <p:txBody>
+          <a:bodyPr wrap="none" rtlCol="0">
+            <a:spAutoFit/>
+          </a:bodyPr>
+          <a:lstStyle/>
+          <a:p>
+            <a:r>
+              <a:rPr lang="en-US" sz="3200" b="1" dirty="0" smtClean="0"/>
+              <a:t>W=1</a:t>
+            </a:r>
+            <a:endParaRPr lang="en-US" sz="3200" b="1" dirty="0"/>
+          </a:p>
+        </p:txBody>
+      </p:sp>
+      <p:sp>
+        <p:nvSpPr>
+          <p:cNvPr id="57" name="TextBox 56"/>
+          <p:cNvSpPr txBox="1"/>
+          <p:nvPr/>
+        </p:nvSpPr>
+        <p:spPr>
+          <a:xfrm>
+            <a:off x="7483284" y="5036765"/>
+            <a:ext cx="823062" cy="584776"/>
+          </a:xfrm>
+          <a:prstGeom prst="rect">
+            <a:avLst/>
+          </a:prstGeom>
+          <a:noFill/>
+        </p:spPr>
+        <p:txBody>
+          <a:bodyPr wrap="none" rtlCol="0">
+            <a:spAutoFit/>
+          </a:bodyPr>
+          <a:lstStyle/>
+          <a:p>
+            <a:r>
+              <a:rPr lang="en-US" sz="3200" b="1" dirty="0" smtClean="0"/>
+              <a:t>Y=3</a:t>
+            </a:r>
+            <a:endParaRPr lang="en-US" sz="3200" b="1" dirty="0"/>
+          </a:p>
+        </p:txBody>
+      </p:sp>
+      <p:sp>
+        <p:nvSpPr>
+          <p:cNvPr id="58" name="TextBox 57"/>
+          <p:cNvSpPr txBox="1"/>
+          <p:nvPr/>
+        </p:nvSpPr>
+        <p:spPr>
+          <a:xfrm>
+            <a:off x="7773423" y="3323086"/>
+            <a:ext cx="1001196" cy="584776"/>
+          </a:xfrm>
+          <a:prstGeom prst="rect">
+            <a:avLst/>
+          </a:prstGeom>
+          <a:noFill/>
+        </p:spPr>
+        <p:txBody>
+          <a:bodyPr wrap="none" rtlCol="0">
+            <a:spAutoFit/>
+          </a:bodyPr>
+          <a:lstStyle/>
+          <a:p>
+            <a:r>
+              <a:rPr lang="en-US" sz="3200" b="1" dirty="0" smtClean="0"/>
+              <a:t>Z=10</a:t>
+            </a:r>
+            <a:endParaRPr lang="en-US" sz="3200" b="1" dirty="0"/>
+          </a:p>
+        </p:txBody>
+      </p:sp>
+      <p:sp>
+        <p:nvSpPr>
+          <p:cNvPr id="59" name="TextBox 58"/>
+          <p:cNvSpPr txBox="1"/>
+          <p:nvPr/>
+        </p:nvSpPr>
+        <p:spPr>
+          <a:xfrm>
+            <a:off x="3529139" y="2574041"/>
+            <a:ext cx="968935" cy="584776"/>
+          </a:xfrm>
+          <a:prstGeom prst="rect">
+            <a:avLst/>
+          </a:prstGeom>
+          <a:noFill/>
+        </p:spPr>
+        <p:txBody>
+          <a:bodyPr wrap="none" rtlCol="0">
+            <a:spAutoFit/>
+          </a:bodyPr>
+          <a:lstStyle/>
+          <a:p>
+            <a:r>
+              <a:rPr lang="en-US" sz="3200" b="1" dirty="0" smtClean="0"/>
+              <a:t>W=1</a:t>
+            </a:r>
+            <a:endParaRPr lang="en-US" sz="3200" b="1" dirty="0"/>
+          </a:p>
+        </p:txBody>
+      </p:sp>
+      <p:sp>
+        <p:nvSpPr>
+          <p:cNvPr id="60" name="TextBox 59"/>
+          <p:cNvSpPr txBox="1"/>
+          <p:nvPr/>
+        </p:nvSpPr>
+        <p:spPr>
+          <a:xfrm>
+            <a:off x="3167682" y="3907862"/>
+            <a:ext cx="968935" cy="584776"/>
+          </a:xfrm>
+          <a:prstGeom prst="rect">
+            <a:avLst/>
+          </a:prstGeom>
+          <a:noFill/>
+        </p:spPr>
+        <p:txBody>
+          <a:bodyPr wrap="none" rtlCol="0">
+            <a:spAutoFit/>
+          </a:bodyPr>
+          <a:lstStyle/>
+          <a:p>
+            <a:r>
+              <a:rPr lang="en-US" sz="3200" b="1" dirty="0" smtClean="0"/>
+              <a:t>W=1</a:t>
+            </a:r>
+            <a:endParaRPr lang="en-US" sz="3200" b="1" dirty="0"/>
+          </a:p>
+        </p:txBody>
+      </p:sp>
+      <p:sp>
+        <p:nvSpPr>
+          <p:cNvPr id="62" name="TextBox 61"/>
+          <p:cNvSpPr txBox="1"/>
+          <p:nvPr/>
+        </p:nvSpPr>
+        <p:spPr>
+          <a:xfrm>
+            <a:off x="6053970" y="4566670"/>
+            <a:ext cx="823062" cy="584776"/>
+          </a:xfrm>
+          <a:prstGeom prst="rect">
+            <a:avLst/>
+          </a:prstGeom>
+          <a:noFill/>
+        </p:spPr>
+        <p:txBody>
+          <a:bodyPr wrap="none" rtlCol="0">
+            <a:spAutoFit/>
+          </a:bodyPr>
+          <a:lstStyle/>
+          <a:p>
+            <a:r>
+              <a:rPr lang="en-US" sz="3200" b="1" dirty="0" smtClean="0"/>
+              <a:t>Y=3</a:t>
+            </a:r>
+            <a:endParaRPr lang="en-US" sz="3200" b="1" dirty="0"/>
+          </a:p>
+        </p:txBody>
+      </p:sp>
+      <p:sp>
+        <p:nvSpPr>
+          <p:cNvPr id="37" name="Oval 36"/>
+          <p:cNvSpPr/>
+          <p:nvPr/>
+        </p:nvSpPr>
+        <p:spPr>
+          <a:xfrm>
+            <a:off x="4419939" y="657938"/>
+            <a:ext cx="914400" cy="914400"/>
+          </a:xfrm>
+          <a:prstGeom prst="ellipse">
+            <a:avLst/>
+          </a:prstGeom>
+          <a:noFill/>
+          <a:ln w="57150" cmpd="sng"/>
+        </p:spPr>
+        <p:style>
+          <a:lnRef idx="1">
+            <a:schemeClr val="accent1"/>
+          </a:lnRef>
+          <a:fillRef idx="3">
+            <a:schemeClr val="accent1"/>
+          </a:fillRef>
+          <a:effectRef idx="2">
+            <a:schemeClr val="accent1"/>
+          </a:effectRef>
+          <a:fontRef idx="minor">
+            <a:schemeClr val="lt1"/>
+          </a:fontRef>
+        </p:style>
+        <p:txBody>
+          <a:bodyPr rtlCol="0" anchor="ctr"/>
+          <a:lstStyle/>
+          <a:p>
+            <a:pPr algn="ctr"/>
+            <a:r>
+              <a:rPr lang="en-US" sz="3200" b="1" dirty="0">
+                <a:solidFill>
+                  <a:srgbClr val="FF0000"/>
+                </a:solidFill>
+              </a:rPr>
+              <a:t>3</a:t>
+            </a:r>
+            <a:endParaRPr lang="en-US" sz="3200" b="1" dirty="0">
+              <a:solidFill>
+                <a:srgbClr val="FF0000"/>
+              </a:solidFill>
+            </a:endParaRPr>
+          </a:p>
+        </p:txBody>
+      </p:sp>
+      <p:sp>
+        <p:nvSpPr>
+          <p:cNvPr id="38" name="Oval 37"/>
+          <p:cNvSpPr/>
+          <p:nvPr/>
+        </p:nvSpPr>
+        <p:spPr>
+          <a:xfrm>
+            <a:off x="6602557" y="5932055"/>
+            <a:ext cx="914400" cy="914400"/>
+          </a:xfrm>
+          <a:prstGeom prst="ellipse">
+            <a:avLst/>
+          </a:prstGeom>
+          <a:noFill/>
+          <a:ln w="57150" cmpd="sng"/>
+        </p:spPr>
+        <p:style>
+          <a:lnRef idx="1">
+            <a:schemeClr val="accent1"/>
+          </a:lnRef>
+          <a:fillRef idx="3">
+            <a:schemeClr val="accent1"/>
+          </a:fillRef>
+          <a:effectRef idx="2">
+            <a:schemeClr val="accent1"/>
+          </a:effectRef>
+          <a:fontRef idx="minor">
+            <a:schemeClr val="lt1"/>
+          </a:fontRef>
+        </p:style>
+        <p:txBody>
+          <a:bodyPr rtlCol="0" anchor="ctr"/>
+          <a:lstStyle/>
+          <a:p>
+            <a:pPr algn="ctr"/>
+            <a:r>
+              <a:rPr lang="en-US" sz="3200" b="1" dirty="0">
+                <a:solidFill>
+                  <a:srgbClr val="FF0000"/>
+                </a:solidFill>
+              </a:rPr>
+              <a:t>3</a:t>
+            </a:r>
+            <a:endParaRPr lang="en-US" sz="3200" b="1" dirty="0">
+              <a:solidFill>
+                <a:srgbClr val="FF0000"/>
+              </a:solidFill>
+            </a:endParaRPr>
+          </a:p>
+        </p:txBody>
+      </p:sp>
+      <p:cxnSp>
+        <p:nvCxnSpPr>
+          <p:cNvPr id="47" name="Straight Arrow Connector 46"/>
+          <p:cNvCxnSpPr>
+            <a:endCxn id="37" idx="2"/>
+          </p:cNvCxnSpPr>
+          <p:nvPr/>
+        </p:nvCxnSpPr>
+        <p:spPr>
+          <a:xfrm flipV="1">
+            <a:off x="330600" y="1115138"/>
+            <a:ext cx="4089339" cy="16297"/>
+          </a:xfrm>
+          <a:prstGeom prst="straightConnector1">
+            <a:avLst/>
+          </a:prstGeom>
+          <a:ln w="76200" cmpd="sng">
+            <a:solidFill>
+              <a:srgbClr val="FF0000"/>
+            </a:solidFill>
+            <a:tailEnd type="arrow"/>
+          </a:ln>
+        </p:spPr>
+        <p:style>
+          <a:lnRef idx="2">
+            <a:schemeClr val="accent1"/>
+          </a:lnRef>
+          <a:fillRef idx="0">
+            <a:schemeClr val="accent1"/>
+          </a:fillRef>
+          <a:effectRef idx="1">
+            <a:schemeClr val="accent1"/>
+          </a:effectRef>
+          <a:fontRef idx="minor">
+            <a:schemeClr val="tx1"/>
+          </a:fontRef>
+        </p:style>
+      </p:cxnSp>
+      <p:cxnSp>
+        <p:nvCxnSpPr>
+          <p:cNvPr id="48" name="Straight Arrow Connector 47"/>
+          <p:cNvCxnSpPr>
+            <a:stCxn id="37" idx="6"/>
+            <a:endCxn id="45" idx="0"/>
+          </p:cNvCxnSpPr>
+          <p:nvPr/>
+        </p:nvCxnSpPr>
+        <p:spPr>
+          <a:xfrm>
+            <a:off x="5334339" y="1115138"/>
+            <a:ext cx="3245879" cy="0"/>
+          </a:xfrm>
+          <a:prstGeom prst="straightConnector1">
+            <a:avLst/>
+          </a:prstGeom>
+          <a:ln w="76200" cmpd="sng">
+            <a:solidFill>
+              <a:srgbClr val="FF0000"/>
+            </a:solidFill>
+            <a:headEnd type="oval"/>
+            <a:tailEnd type="triangle"/>
+          </a:ln>
+        </p:spPr>
+        <p:style>
+          <a:lnRef idx="2">
+            <a:schemeClr val="accent1"/>
+          </a:lnRef>
+          <a:fillRef idx="0">
+            <a:schemeClr val="accent1"/>
+          </a:fillRef>
+          <a:effectRef idx="1">
+            <a:schemeClr val="accent1"/>
+          </a:effectRef>
+          <a:fontRef idx="minor">
+            <a:schemeClr val="tx1"/>
+          </a:fontRef>
+        </p:style>
+      </p:cxnSp>
+      <p:cxnSp>
+        <p:nvCxnSpPr>
+          <p:cNvPr id="25" name="Straight Arrow Connector 24"/>
+          <p:cNvCxnSpPr>
+            <a:stCxn id="4" idx="7"/>
+            <a:endCxn id="37" idx="3"/>
+          </p:cNvCxnSpPr>
+          <p:nvPr/>
+        </p:nvCxnSpPr>
+        <p:spPr>
+          <a:xfrm flipV="1">
+            <a:off x="4286028" y="1438427"/>
+            <a:ext cx="267822" cy="180363"/>
+          </a:xfrm>
+          <a:prstGeom prst="straightConnector1">
+            <a:avLst/>
+          </a:prstGeom>
+          <a:ln>
+            <a:tailEnd type="arrow"/>
+          </a:ln>
+        </p:spPr>
+        <p:style>
+          <a:lnRef idx="2">
+            <a:schemeClr val="accent1"/>
+          </a:lnRef>
+          <a:fillRef idx="0">
+            <a:schemeClr val="accent1"/>
+          </a:fillRef>
+          <a:effectRef idx="1">
+            <a:schemeClr val="accent1"/>
+          </a:effectRef>
+          <a:fontRef idx="minor">
+            <a:schemeClr val="tx1"/>
+          </a:fontRef>
+        </p:style>
+      </p:cxnSp>
+      <p:cxnSp>
+        <p:nvCxnSpPr>
+          <p:cNvPr id="55" name="Straight Arrow Connector 54"/>
+          <p:cNvCxnSpPr>
+            <a:stCxn id="38" idx="2"/>
+          </p:cNvCxnSpPr>
+          <p:nvPr/>
+        </p:nvCxnSpPr>
+        <p:spPr>
+          <a:xfrm flipH="1">
+            <a:off x="330600" y="6389255"/>
+            <a:ext cx="6271957" cy="0"/>
+          </a:xfrm>
+          <a:prstGeom prst="straightConnector1">
+            <a:avLst/>
+          </a:prstGeom>
+          <a:ln w="76200" cmpd="sng">
+            <a:solidFill>
+              <a:srgbClr val="FF0000"/>
+            </a:solidFill>
+            <a:headEnd type="arrow"/>
+            <a:tailEnd type="none"/>
+          </a:ln>
+        </p:spPr>
+        <p:style>
+          <a:lnRef idx="2">
+            <a:schemeClr val="accent1"/>
+          </a:lnRef>
+          <a:fillRef idx="0">
+            <a:schemeClr val="accent1"/>
+          </a:fillRef>
+          <a:effectRef idx="1">
+            <a:schemeClr val="accent1"/>
+          </a:effectRef>
+          <a:fontRef idx="minor">
+            <a:schemeClr val="tx1"/>
+          </a:fontRef>
+        </p:style>
+      </p:cxnSp>
+      <p:cxnSp>
+        <p:nvCxnSpPr>
+          <p:cNvPr id="41" name="Straight Arrow Connector 40"/>
+          <p:cNvCxnSpPr/>
+          <p:nvPr/>
+        </p:nvCxnSpPr>
+        <p:spPr>
+          <a:xfrm>
+            <a:off x="6053970" y="5932055"/>
+            <a:ext cx="548587" cy="457200"/>
+          </a:xfrm>
+          <a:prstGeom prst="straightConnector1">
+            <a:avLst/>
+          </a:prstGeom>
+          <a:ln>
+            <a:tailEnd type="arrow"/>
+          </a:ln>
+        </p:spPr>
+        <p:style>
+          <a:lnRef idx="2">
+            <a:schemeClr val="accent1"/>
+          </a:lnRef>
+          <a:fillRef idx="0">
+            <a:schemeClr val="accent1"/>
+          </a:fillRef>
+          <a:effectRef idx="1">
+            <a:schemeClr val="accent1"/>
+          </a:effectRef>
+          <a:fontRef idx="minor">
+            <a:schemeClr val="tx1"/>
+          </a:fontRef>
+        </p:style>
+      </p:cxnSp>
+      <p:cxnSp>
+        <p:nvCxnSpPr>
+          <p:cNvPr id="63" name="Straight Arrow Connector 62"/>
+          <p:cNvCxnSpPr>
+            <a:stCxn id="38" idx="6"/>
+          </p:cNvCxnSpPr>
+          <p:nvPr/>
+        </p:nvCxnSpPr>
+        <p:spPr>
+          <a:xfrm>
+            <a:off x="7516957" y="6389255"/>
+            <a:ext cx="1349952" cy="0"/>
+          </a:xfrm>
+          <a:prstGeom prst="straightConnector1">
+            <a:avLst/>
+          </a:prstGeom>
+          <a:ln w="76200" cmpd="sng">
+            <a:solidFill>
+              <a:srgbClr val="FF0000"/>
+            </a:solidFill>
+            <a:headEnd type="oval"/>
+            <a:tailEnd type="triangle"/>
+          </a:ln>
+        </p:spPr>
+        <p:style>
+          <a:lnRef idx="2">
+            <a:schemeClr val="accent1"/>
+          </a:lnRef>
+          <a:fillRef idx="0">
+            <a:schemeClr val="accent1"/>
+          </a:fillRef>
+          <a:effectRef idx="1">
+            <a:schemeClr val="accent1"/>
+          </a:effectRef>
+          <a:fontRef idx="minor">
+            <a:schemeClr val="tx1"/>
+          </a:fontRef>
+        </p:style>
+      </p:cxnSp>
+      <p:sp>
+        <p:nvSpPr>
+          <p:cNvPr id="65" name="TextBox 64"/>
+          <p:cNvSpPr txBox="1"/>
+          <p:nvPr/>
+        </p:nvSpPr>
+        <p:spPr>
+          <a:xfrm>
+            <a:off x="7903766" y="210548"/>
+            <a:ext cx="433332" cy="584776"/>
+          </a:xfrm>
+          <a:prstGeom prst="rect">
+            <a:avLst/>
+          </a:prstGeom>
+          <a:noFill/>
+        </p:spPr>
+        <p:txBody>
+          <a:bodyPr wrap="none" rtlCol="0">
+            <a:spAutoFit/>
+          </a:bodyPr>
+          <a:lstStyle/>
+          <a:p>
+            <a:r>
+              <a:rPr lang="en-US" sz="3200" b="1" dirty="0" smtClean="0">
+                <a:solidFill>
+                  <a:srgbClr val="FF0000"/>
+                </a:solidFill>
+              </a:rPr>
+              <a:t>A</a:t>
+            </a:r>
+            <a:endParaRPr lang="en-US" sz="3200" b="1" dirty="0">
+              <a:solidFill>
+                <a:srgbClr val="FF0000"/>
+              </a:solidFill>
+            </a:endParaRPr>
+          </a:p>
+        </p:txBody>
+      </p:sp>
+      <p:sp>
+        <p:nvSpPr>
+          <p:cNvPr id="66" name="TextBox 65"/>
+          <p:cNvSpPr txBox="1"/>
+          <p:nvPr/>
+        </p:nvSpPr>
+        <p:spPr>
+          <a:xfrm>
+            <a:off x="8409962" y="5582803"/>
+            <a:ext cx="414697" cy="584776"/>
+          </a:xfrm>
+          <a:prstGeom prst="rect">
+            <a:avLst/>
+          </a:prstGeom>
+          <a:noFill/>
+        </p:spPr>
+        <p:txBody>
+          <a:bodyPr wrap="none" rtlCol="0">
+            <a:spAutoFit/>
+          </a:bodyPr>
+          <a:lstStyle/>
+          <a:p>
+            <a:r>
+              <a:rPr lang="en-US" sz="3200" b="1" dirty="0" smtClean="0">
+                <a:solidFill>
+                  <a:srgbClr val="FF0000"/>
+                </a:solidFill>
+              </a:rPr>
+              <a:t>B</a:t>
+            </a:r>
+            <a:endParaRPr lang="en-US" sz="3200" b="1" dirty="0">
+              <a:solidFill>
+                <a:srgbClr val="FF0000"/>
+              </a:solidFill>
+            </a:endParaRPr>
+          </a:p>
+        </p:txBody>
+      </p:sp>
+      <p:sp>
+        <p:nvSpPr>
+          <p:cNvPr id="67" name="TextBox 66"/>
+          <p:cNvSpPr txBox="1"/>
+          <p:nvPr/>
+        </p:nvSpPr>
+        <p:spPr>
+          <a:xfrm>
+            <a:off x="342280" y="575312"/>
+            <a:ext cx="845704" cy="584776"/>
+          </a:xfrm>
+          <a:prstGeom prst="rect">
+            <a:avLst/>
+          </a:prstGeom>
+          <a:noFill/>
+        </p:spPr>
+        <p:txBody>
+          <a:bodyPr wrap="none" rtlCol="0">
+            <a:spAutoFit/>
+          </a:bodyPr>
+          <a:lstStyle/>
+          <a:p>
+            <a:r>
+              <a:rPr lang="en-US" sz="3200" b="1" dirty="0" smtClean="0"/>
+              <a:t>A=0</a:t>
+            </a:r>
+            <a:endParaRPr lang="en-US" sz="3200" b="1" dirty="0"/>
+          </a:p>
+        </p:txBody>
+      </p:sp>
+      <p:sp>
+        <p:nvSpPr>
+          <p:cNvPr id="68" name="TextBox 67"/>
+          <p:cNvSpPr txBox="1"/>
+          <p:nvPr/>
+        </p:nvSpPr>
+        <p:spPr>
+          <a:xfrm>
+            <a:off x="317063" y="5804479"/>
+            <a:ext cx="827069" cy="584776"/>
+          </a:xfrm>
+          <a:prstGeom prst="rect">
+            <a:avLst/>
+          </a:prstGeom>
+          <a:noFill/>
+        </p:spPr>
+        <p:txBody>
+          <a:bodyPr wrap="none" rtlCol="0">
+            <a:spAutoFit/>
+          </a:bodyPr>
+          <a:lstStyle/>
+          <a:p>
+            <a:r>
+              <a:rPr lang="en-US" sz="3200" b="1" dirty="0"/>
+              <a:t>B</a:t>
+            </a:r>
+            <a:r>
+              <a:rPr lang="en-US" sz="3200" b="1" dirty="0" smtClean="0"/>
+              <a:t>=0</a:t>
+            </a:r>
+            <a:endParaRPr lang="en-US" sz="3200" b="1" dirty="0"/>
+          </a:p>
+        </p:txBody>
+      </p:sp>
+      <p:sp>
+        <p:nvSpPr>
+          <p:cNvPr id="69" name="TextBox 68"/>
+          <p:cNvSpPr txBox="1"/>
+          <p:nvPr/>
+        </p:nvSpPr>
+        <p:spPr>
+          <a:xfrm>
+            <a:off x="5643567" y="365550"/>
+            <a:ext cx="845704" cy="584776"/>
+          </a:xfrm>
+          <a:prstGeom prst="rect">
+            <a:avLst/>
+          </a:prstGeom>
+          <a:noFill/>
+        </p:spPr>
+        <p:txBody>
+          <a:bodyPr wrap="none" rtlCol="0">
+            <a:spAutoFit/>
+          </a:bodyPr>
+          <a:lstStyle/>
+          <a:p>
+            <a:r>
+              <a:rPr lang="en-US" sz="3200" b="1" dirty="0"/>
+              <a:t>A</a:t>
+            </a:r>
+            <a:r>
+              <a:rPr lang="en-US" sz="3200" b="1" dirty="0" smtClean="0"/>
+              <a:t>=</a:t>
+            </a:r>
+            <a:r>
+              <a:rPr lang="en-US" sz="3200" b="1" dirty="0"/>
+              <a:t>4</a:t>
+            </a:r>
+          </a:p>
+        </p:txBody>
+      </p:sp>
+      <p:sp>
+        <p:nvSpPr>
+          <p:cNvPr id="70" name="TextBox 69"/>
+          <p:cNvSpPr txBox="1"/>
+          <p:nvPr/>
+        </p:nvSpPr>
+        <p:spPr>
+          <a:xfrm>
+            <a:off x="7628607" y="5804479"/>
+            <a:ext cx="827069" cy="584776"/>
+          </a:xfrm>
+          <a:prstGeom prst="rect">
+            <a:avLst/>
+          </a:prstGeom>
+          <a:noFill/>
+        </p:spPr>
+        <p:txBody>
+          <a:bodyPr wrap="none" rtlCol="0">
+            <a:spAutoFit/>
+          </a:bodyPr>
+          <a:lstStyle/>
+          <a:p>
+            <a:r>
+              <a:rPr lang="en-US" sz="3200" b="1" dirty="0"/>
+              <a:t>B</a:t>
+            </a:r>
+            <a:r>
+              <a:rPr lang="en-US" sz="3200" b="1" dirty="0" smtClean="0"/>
+              <a:t>=6</a:t>
+            </a:r>
+            <a:endParaRPr lang="en-US" sz="3200" b="1" dirty="0"/>
+          </a:p>
+        </p:txBody>
+      </p:sp>
+      <p:sp>
+        <p:nvSpPr>
+          <p:cNvPr id="6" name="TextBox 5"/>
+          <p:cNvSpPr txBox="1"/>
+          <p:nvPr/>
+        </p:nvSpPr>
+        <p:spPr>
+          <a:xfrm>
+            <a:off x="1299159" y="87438"/>
+            <a:ext cx="2773015" cy="707886"/>
+          </a:xfrm>
+          <a:prstGeom prst="rect">
+            <a:avLst/>
+          </a:prstGeom>
+          <a:solidFill>
+            <a:srgbClr val="FFFF00"/>
+          </a:solidFill>
+        </p:spPr>
+        <p:txBody>
+          <a:bodyPr wrap="none" rtlCol="0">
+            <a:spAutoFit/>
+          </a:bodyPr>
+          <a:lstStyle/>
+          <a:p>
+            <a:r>
+              <a:rPr lang="en-US" sz="4000" b="1" dirty="0" smtClean="0"/>
+              <a:t>Timestamps</a:t>
+            </a:r>
+            <a:endParaRPr lang="en-US" sz="4000" b="1" dirty="0"/>
+          </a:p>
+        </p:txBody>
+      </p:sp>
+      <p:cxnSp>
+        <p:nvCxnSpPr>
+          <p:cNvPr id="10" name="Straight Arrow Connector 9"/>
+          <p:cNvCxnSpPr>
+            <a:stCxn id="6" idx="2"/>
+          </p:cNvCxnSpPr>
+          <p:nvPr/>
+        </p:nvCxnSpPr>
+        <p:spPr>
+          <a:xfrm flipH="1">
+            <a:off x="1801091" y="795324"/>
+            <a:ext cx="884576" cy="2282844"/>
+          </a:xfrm>
+          <a:prstGeom prst="straightConnector1">
+            <a:avLst/>
+          </a:prstGeom>
+          <a:ln>
+            <a:tailEnd type="arrow"/>
+          </a:ln>
+        </p:spPr>
+        <p:style>
+          <a:lnRef idx="2">
+            <a:schemeClr val="accent1"/>
+          </a:lnRef>
+          <a:fillRef idx="0">
+            <a:schemeClr val="accent1"/>
+          </a:fillRef>
+          <a:effectRef idx="1">
+            <a:schemeClr val="accent1"/>
+          </a:effectRef>
+          <a:fontRef idx="minor">
+            <a:schemeClr val="tx1"/>
+          </a:fontRef>
+        </p:style>
+      </p:cxnSp>
+      <p:cxnSp>
+        <p:nvCxnSpPr>
+          <p:cNvPr id="13" name="Straight Arrow Connector 12"/>
+          <p:cNvCxnSpPr/>
+          <p:nvPr/>
+        </p:nvCxnSpPr>
+        <p:spPr>
+          <a:xfrm>
+            <a:off x="2685667" y="657938"/>
+            <a:ext cx="1216697" cy="1041976"/>
+          </a:xfrm>
+          <a:prstGeom prst="straightConnector1">
+            <a:avLst/>
+          </a:prstGeom>
+          <a:ln>
+            <a:tailEnd type="arrow"/>
+          </a:ln>
+        </p:spPr>
+        <p:style>
+          <a:lnRef idx="2">
+            <a:schemeClr val="accent1"/>
+          </a:lnRef>
+          <a:fillRef idx="0">
+            <a:schemeClr val="accent1"/>
+          </a:fillRef>
+          <a:effectRef idx="1">
+            <a:schemeClr val="accent1"/>
+          </a:effectRef>
+          <a:fontRef idx="minor">
+            <a:schemeClr val="tx1"/>
+          </a:fontRef>
+        </p:style>
+      </p:cxnSp>
+      <p:cxnSp>
+        <p:nvCxnSpPr>
+          <p:cNvPr id="15" name="Straight Arrow Connector 14"/>
+          <p:cNvCxnSpPr/>
+          <p:nvPr/>
+        </p:nvCxnSpPr>
+        <p:spPr>
+          <a:xfrm>
+            <a:off x="2685667" y="657938"/>
+            <a:ext cx="2047969" cy="473497"/>
+          </a:xfrm>
+          <a:prstGeom prst="straightConnector1">
+            <a:avLst/>
+          </a:prstGeom>
+          <a:ln>
+            <a:tailEnd type="arrow"/>
+          </a:ln>
+        </p:spPr>
+        <p:style>
+          <a:lnRef idx="2">
+            <a:schemeClr val="accent1"/>
+          </a:lnRef>
+          <a:fillRef idx="0">
+            <a:schemeClr val="accent1"/>
+          </a:fillRef>
+          <a:effectRef idx="1">
+            <a:schemeClr val="accent1"/>
+          </a:effectRef>
+          <a:fontRef idx="minor">
+            <a:schemeClr val="tx1"/>
+          </a:fontRef>
+        </p:style>
+      </p:cxnSp>
+    </p:spTree>
+    <p:extLst>
+      <p:ext uri="{BB962C8B-B14F-4D97-AF65-F5344CB8AC3E}">
+        <p14:creationId xmlns:p14="http://schemas.microsoft.com/office/powerpoint/2010/main" val="2167360985"/>
+      </p:ext>
+    </p:extLst>
+  </p:cSld>
+  <p:clrMapOvr>
+    <a:masterClrMapping/>
+  </p:clrMapOvr>
+  <p:timing>
+    <p:tnLst>
+      <p:par>
+        <p:cTn xmlns:p14="http://schemas.microsoft.com/office/powerpoint/2010/main" id="1" dur="indefinite" restart="never" nodeType="tmRoot"/>
+      </p:par>
+    </p:tnLst>
+  </p:timing>
 </p:sld>
 </file>
 

</xml_diff>

<commit_message>
Added Timeline Diagram Part Two Video.
</commit_message>
<xml_diff>
--- a/TimelineDiagrams/TimelineDiagrams.pptx
+++ b/TimelineDiagrams/TimelineDiagrams.pptx
@@ -39479,8 +39479,8 @@
         </p:nvCxnSpPr>
         <p:spPr>
           <a:xfrm>
-            <a:off x="1818758" y="2036192"/>
-            <a:ext cx="3320812" cy="0"/>
+            <a:off x="317063" y="2036192"/>
+            <a:ext cx="4822507" cy="0"/>
           </a:xfrm>
           <a:prstGeom prst="straightConnector1">
             <a:avLst/>
@@ -40123,7 +40123,7 @@
         </p:nvSpPr>
         <p:spPr>
           <a:xfrm>
-            <a:off x="5158319" y="1408407"/>
+            <a:off x="7361892" y="1599079"/>
             <a:ext cx="823062" cy="584776"/>
           </a:xfrm>
           <a:prstGeom prst="rect">
@@ -40183,7 +40183,7 @@
         </p:nvSpPr>
         <p:spPr>
           <a:xfrm>
-            <a:off x="7483284" y="5036765"/>
+            <a:off x="6523348" y="5146964"/>
             <a:ext cx="744865" cy="523220"/>
           </a:xfrm>
           <a:prstGeom prst="rect">
@@ -40273,7 +40273,7 @@
         </p:nvSpPr>
         <p:spPr>
           <a:xfrm>
-            <a:off x="3167682" y="3907862"/>
+            <a:off x="2169434" y="3498752"/>
             <a:ext cx="968935" cy="584776"/>
           </a:xfrm>
           <a:prstGeom prst="rect">
@@ -40429,8 +40429,8 @@
         </p:nvCxnSpPr>
         <p:spPr>
           <a:xfrm flipV="1">
-            <a:off x="1892042" y="1140925"/>
-            <a:ext cx="4089339" cy="16297"/>
+            <a:off x="342280" y="1140925"/>
+            <a:ext cx="5639101" cy="16297"/>
           </a:xfrm>
           <a:prstGeom prst="straightConnector1">
             <a:avLst/>
@@ -40460,13 +40460,15 @@
       <p:cxnSp>
         <p:nvCxnSpPr>
           <p:cNvPr id="48" name="Straight Arrow Connector 47"/>
-          <p:cNvCxnSpPr/>
+          <p:cNvCxnSpPr>
+            <a:stCxn id="37" idx="6"/>
+          </p:cNvCxnSpPr>
           <p:nvPr/>
         </p:nvCxnSpPr>
         <p:spPr>
           <a:xfrm>
-            <a:off x="6511170" y="1157222"/>
-            <a:ext cx="2263449" cy="0"/>
+            <a:off x="6895781" y="1140925"/>
+            <a:ext cx="1878838" cy="16297"/>
           </a:xfrm>
           <a:prstGeom prst="straightConnector1">
             <a:avLst/>
@@ -40791,7 +40793,7 @@
         </p:nvSpPr>
         <p:spPr>
           <a:xfrm>
-            <a:off x="7060432" y="1078118"/>
+            <a:off x="6951561" y="575312"/>
             <a:ext cx="845704" cy="584776"/>
           </a:xfrm>
           <a:prstGeom prst="rect">
@@ -40828,7 +40830,7 @@
         </p:nvSpPr>
         <p:spPr>
           <a:xfrm>
-            <a:off x="7628607" y="5804479"/>
+            <a:off x="5920059" y="5804479"/>
             <a:ext cx="827069" cy="584776"/>
           </a:xfrm>
           <a:prstGeom prst="rect">
@@ -41883,7 +41885,7 @@
         </p:nvSpPr>
         <p:spPr>
           <a:xfrm>
-            <a:off x="5158319" y="1408407"/>
+            <a:off x="6524583" y="1357303"/>
             <a:ext cx="823062" cy="584776"/>
           </a:xfrm>
           <a:prstGeom prst="rect">
@@ -41943,7 +41945,7 @@
         </p:nvSpPr>
         <p:spPr>
           <a:xfrm>
-            <a:off x="7483284" y="5036765"/>
+            <a:off x="7269999" y="4849981"/>
             <a:ext cx="744865" cy="523220"/>
           </a:xfrm>
           <a:prstGeom prst="rect">
@@ -42033,7 +42035,7 @@
         </p:nvSpPr>
         <p:spPr>
           <a:xfrm>
-            <a:off x="3167682" y="3907862"/>
+            <a:off x="2931553" y="3486310"/>
             <a:ext cx="968935" cy="584776"/>
           </a:xfrm>
           <a:prstGeom prst="rect">
@@ -42063,7 +42065,7 @@
         </p:nvSpPr>
         <p:spPr>
           <a:xfrm>
-            <a:off x="6053970" y="4566670"/>
+            <a:off x="6316744" y="5083546"/>
             <a:ext cx="744865" cy="523220"/>
           </a:xfrm>
           <a:prstGeom prst="rect">
@@ -42759,6 +42761,43 @@
               <a:t>T</a:t>
             </a:r>
             <a:endParaRPr lang="en-US" sz="9600" b="1" dirty="0"/>
+          </a:p>
+        </p:txBody>
+      </p:sp>
+      <p:sp>
+        <p:nvSpPr>
+          <p:cNvPr id="61" name="TextBox 60"/>
+          <p:cNvSpPr txBox="1"/>
+          <p:nvPr/>
+        </p:nvSpPr>
+        <p:spPr>
+          <a:xfrm>
+            <a:off x="6293620" y="2185157"/>
+            <a:ext cx="845704" cy="584776"/>
+          </a:xfrm>
+          <a:prstGeom prst="rect">
+            <a:avLst/>
+          </a:prstGeom>
+          <a:noFill/>
+        </p:spPr>
+        <p:txBody>
+          <a:bodyPr wrap="none" rtlCol="0">
+            <a:spAutoFit/>
+          </a:bodyPr>
+          <a:lstStyle/>
+          <a:p>
+            <a:r>
+              <a:rPr lang="en-US" sz="3200" b="1" dirty="0"/>
+              <a:t>A</a:t>
+            </a:r>
+            <a:r>
+              <a:rPr lang="en-US" sz="3200" b="1" dirty="0" smtClean="0"/>
+              <a:t>=</a:t>
+            </a:r>
+            <a:r>
+              <a:rPr lang="en-US" sz="3200" b="1" dirty="0"/>
+              <a:t>4</a:t>
+            </a:r>
           </a:p>
         </p:txBody>
       </p:sp>

</xml_diff>